<commit_message>
teoria devops 3 finita
</commit_message>
<xml_diff>
--- a/DEVOPS-3-TODO.pptx
+++ b/DEVOPS-3-TODO.pptx
@@ -5,10 +5,10 @@
     <p:sldMasterId id="2147483660" r:id="rId1"/>
   </p:sldMasterIdLst>
   <p:notesMasterIdLst>
-    <p:notesMasterId r:id="rId27"/>
+    <p:notesMasterId r:id="rId28"/>
   </p:notesMasterIdLst>
   <p:handoutMasterIdLst>
-    <p:handoutMasterId r:id="rId28"/>
+    <p:handoutMasterId r:id="rId29"/>
   </p:handoutMasterIdLst>
   <p:sldIdLst>
     <p:sldId id="256" r:id="rId2"/>
@@ -17,25 +17,26 @@
     <p:sldId id="330" r:id="rId5"/>
     <p:sldId id="264" r:id="rId6"/>
     <p:sldId id="352" r:id="rId7"/>
-    <p:sldId id="332" r:id="rId8"/>
-    <p:sldId id="353" r:id="rId9"/>
-    <p:sldId id="354" r:id="rId10"/>
-    <p:sldId id="355" r:id="rId11"/>
-    <p:sldId id="356" r:id="rId12"/>
-    <p:sldId id="357" r:id="rId13"/>
-    <p:sldId id="358" r:id="rId14"/>
-    <p:sldId id="359" r:id="rId15"/>
-    <p:sldId id="360" r:id="rId16"/>
-    <p:sldId id="362" r:id="rId17"/>
-    <p:sldId id="361" r:id="rId18"/>
-    <p:sldId id="366" r:id="rId19"/>
-    <p:sldId id="331" r:id="rId20"/>
-    <p:sldId id="363" r:id="rId21"/>
-    <p:sldId id="364" r:id="rId22"/>
-    <p:sldId id="365" r:id="rId23"/>
-    <p:sldId id="349" r:id="rId24"/>
-    <p:sldId id="350" r:id="rId25"/>
-    <p:sldId id="292" r:id="rId26"/>
+    <p:sldId id="367" r:id="rId8"/>
+    <p:sldId id="368" r:id="rId9"/>
+    <p:sldId id="332" r:id="rId10"/>
+    <p:sldId id="369" r:id="rId11"/>
+    <p:sldId id="370" r:id="rId12"/>
+    <p:sldId id="371" r:id="rId13"/>
+    <p:sldId id="372" r:id="rId14"/>
+    <p:sldId id="373" r:id="rId15"/>
+    <p:sldId id="374" r:id="rId16"/>
+    <p:sldId id="375" r:id="rId17"/>
+    <p:sldId id="331" r:id="rId18"/>
+    <p:sldId id="376" r:id="rId19"/>
+    <p:sldId id="377" r:id="rId20"/>
+    <p:sldId id="378" r:id="rId21"/>
+    <p:sldId id="379" r:id="rId22"/>
+    <p:sldId id="380" r:id="rId23"/>
+    <p:sldId id="381" r:id="rId24"/>
+    <p:sldId id="349" r:id="rId25"/>
+    <p:sldId id="350" r:id="rId26"/>
+    <p:sldId id="292" r:id="rId27"/>
   </p:sldIdLst>
   <p:sldSz cx="9144000" cy="5143500" type="screen16x9"/>
   <p:notesSz cx="6858000" cy="9144000"/>
@@ -145,22 +146,23 @@
             <p14:sldId id="330"/>
             <p14:sldId id="264"/>
             <p14:sldId id="352"/>
+            <p14:sldId id="367"/>
+            <p14:sldId id="368"/>
             <p14:sldId id="332"/>
-            <p14:sldId id="353"/>
-            <p14:sldId id="354"/>
-            <p14:sldId id="355"/>
-            <p14:sldId id="356"/>
-            <p14:sldId id="357"/>
-            <p14:sldId id="358"/>
-            <p14:sldId id="359"/>
-            <p14:sldId id="360"/>
-            <p14:sldId id="362"/>
-            <p14:sldId id="361"/>
-            <p14:sldId id="366"/>
+            <p14:sldId id="369"/>
+            <p14:sldId id="370"/>
+            <p14:sldId id="371"/>
+            <p14:sldId id="372"/>
+            <p14:sldId id="373"/>
+            <p14:sldId id="374"/>
+            <p14:sldId id="375"/>
             <p14:sldId id="331"/>
-            <p14:sldId id="363"/>
-            <p14:sldId id="364"/>
-            <p14:sldId id="365"/>
+            <p14:sldId id="376"/>
+            <p14:sldId id="377"/>
+            <p14:sldId id="378"/>
+            <p14:sldId id="379"/>
+            <p14:sldId id="380"/>
+            <p14:sldId id="381"/>
             <p14:sldId id="349"/>
             <p14:sldId id="350"/>
           </p14:sldIdLst>
@@ -272,7 +274,7 @@
           <a:p>
             <a:fld id="{786D4E21-AA1D-BE49-8829-DEA10D5CF4C8}" type="datetimeFigureOut">
               <a:rPr lang="it-IT" smtClean="0"/>
-              <a:t>23/02/2018</a:t>
+              <a:t>24/02/2018</a:t>
             </a:fld>
             <a:endParaRPr lang="it-IT"/>
           </a:p>
@@ -438,7 +440,7 @@
           <a:p>
             <a:fld id="{23F6D68F-7DBE-1C48-BC1F-E6A07B52C7E0}" type="datetimeFigureOut">
               <a:rPr lang="it-IT" smtClean="0"/>
-              <a:t>23/02/2018</a:t>
+              <a:t>24/02/2018</a:t>
             </a:fld>
             <a:endParaRPr lang="it-IT"/>
           </a:p>
@@ -6738,8 +6740,8 @@
           <a:lstStyle/>
           <a:p>
             <a:r>
-              <a:rPr lang="it-IT" smtClean="0"/>
-              <a:t>Ci pipelne</a:t>
+              <a:rPr lang="it-IT" dirty="0" smtClean="0"/>
+              <a:t>Continuous delivery</a:t>
             </a:r>
             <a:endParaRPr lang="it-IT" dirty="0"/>
           </a:p>
@@ -6762,7 +6764,7 @@
           <a:p>
             <a:r>
               <a:rPr lang="it-IT" dirty="0" smtClean="0"/>
-              <a:t>Integration flow</a:t>
+              <a:t>ingredienti</a:t>
             </a:r>
             <a:endParaRPr lang="it-IT" dirty="0"/>
           </a:p>
@@ -6770,7 +6772,7 @@
       </p:sp>
       <p:sp>
         <p:nvSpPr>
-          <p:cNvPr id="8" name="Content Placeholder 7"/>
+          <p:cNvPr id="4" name="Content Placeholder 3"/>
           <p:cNvSpPr>
             <a:spLocks noGrp="1"/>
           </p:cNvSpPr>
@@ -6778,114 +6780,43 @@
             <p:ph idx="10"/>
           </p:nvPr>
         </p:nvSpPr>
-        <p:spPr>
-          <a:xfrm>
-            <a:off x="603248" y="1594892"/>
-            <a:ext cx="7937501" cy="2885010"/>
-          </a:xfrm>
-        </p:spPr>
+        <p:spPr/>
         <p:txBody>
           <a:bodyPr/>
           <a:lstStyle/>
           <a:p>
-            <a:pPr marL="0" indent="0">
-              <a:buNone/>
-            </a:pPr>
-            <a:r>
-              <a:rPr lang="it-IT" dirty="0" smtClean="0"/>
-              <a:t>La pipeline esegue 3 passi fondamentali:</a:t>
-            </a:r>
-          </a:p>
-          <a:p>
-            <a:pPr>
-              <a:buFont typeface="+mj-lt"/>
-              <a:buAutoNum type="arabicPeriod"/>
-            </a:pPr>
-            <a:r>
-              <a:rPr lang="it-IT" b="1" cap="all" dirty="0">
-                <a:solidFill>
-                  <a:schemeClr val="tx2"/>
-                </a:solidFill>
-                <a:latin typeface="Arial"/>
-                <a:cs typeface="Arial"/>
-              </a:rPr>
-              <a:t>Build</a:t>
-            </a:r>
-            <a:r>
-              <a:rPr lang="it-IT" dirty="0" smtClean="0"/>
-              <a:t>: fatta una e una sola volta in ambiente standardizzato (identico a quello di produzione)</a:t>
-            </a:r>
-          </a:p>
-          <a:p>
-            <a:pPr>
-              <a:buFont typeface="+mj-lt"/>
-              <a:buAutoNum type="arabicPeriod"/>
-            </a:pPr>
-            <a:endParaRPr lang="it-IT" dirty="0" smtClean="0"/>
-          </a:p>
-          <a:p>
-            <a:pPr>
-              <a:buFont typeface="+mj-lt"/>
-              <a:buAutoNum type="arabicPeriod"/>
-            </a:pPr>
-            <a:r>
-              <a:rPr lang="it-IT" b="1" cap="all" dirty="0">
-                <a:solidFill>
-                  <a:schemeClr val="tx2"/>
-                </a:solidFill>
-                <a:latin typeface="Arial"/>
-                <a:cs typeface="Arial"/>
-              </a:rPr>
-              <a:t>Test</a:t>
-            </a:r>
-            <a:r>
-              <a:rPr lang="it-IT" dirty="0" smtClean="0"/>
-              <a:t>: Unit, Smoke, Integration, ... Assicurando la qualità del prodotto</a:t>
-            </a:r>
-          </a:p>
-          <a:p>
-            <a:pPr>
-              <a:buFont typeface="+mj-lt"/>
-              <a:buAutoNum type="arabicPeriod"/>
-            </a:pPr>
-            <a:endParaRPr lang="it-IT" dirty="0" smtClean="0"/>
-          </a:p>
-          <a:p>
-            <a:pPr>
-              <a:buFont typeface="+mj-lt"/>
-              <a:buAutoNum type="arabicPeriod"/>
-            </a:pPr>
-            <a:r>
-              <a:rPr lang="it-IT" b="1" cap="all" dirty="0">
-                <a:solidFill>
-                  <a:schemeClr val="tx2"/>
-                </a:solidFill>
-                <a:latin typeface="Arial"/>
-                <a:cs typeface="Arial"/>
-              </a:rPr>
-              <a:t>Notify</a:t>
-            </a:r>
-            <a:r>
-              <a:rPr lang="it-IT" dirty="0" smtClean="0"/>
-              <a:t>: notifica successi e fallimenti </a:t>
-            </a:r>
-            <a:r>
-              <a:rPr lang="it-IT" cap="all" dirty="0">
-                <a:solidFill>
-                  <a:schemeClr val="tx2"/>
-                </a:solidFill>
-                <a:latin typeface="Arial"/>
-                <a:cs typeface="Arial"/>
-              </a:rPr>
-              <a:t>a tutto il team</a:t>
-            </a:r>
+            <a:r>
+              <a:rPr lang="it-IT" dirty="0" smtClean="0"/>
+              <a:t>Deploy automatico con componenti di alto livello</a:t>
+            </a:r>
+          </a:p>
+          <a:p>
+            <a:r>
+              <a:rPr lang="it-IT" dirty="0" smtClean="0"/>
+              <a:t>Pipeline di CI estesa</a:t>
+            </a:r>
+          </a:p>
+          <a:p>
+            <a:r>
+              <a:rPr lang="it-IT" dirty="0" smtClean="0"/>
+              <a:t>On / Off per ogni Feature</a:t>
+            </a:r>
+          </a:p>
+          <a:p>
+            <a:r>
+              <a:rPr lang="it-IT" dirty="0" smtClean="0"/>
+              <a:t>Sistema di controllo del Release</a:t>
+            </a:r>
+          </a:p>
+          <a:p>
+            <a:endParaRPr lang="it-IT" dirty="0"/>
           </a:p>
         </p:txBody>
       </p:sp>
     </p:spTree>
     <p:extLst>
       <p:ext uri="{BB962C8B-B14F-4D97-AF65-F5344CB8AC3E}">
-        <p14:creationId xmlns:p14="http://schemas.microsoft.com/office/powerpoint/2010/main" val="1643374169"/>
+        <p14:creationId xmlns:p14="http://schemas.microsoft.com/office/powerpoint/2010/main" val="601361923"/>
       </p:ext>
     </p:extLst>
   </p:cSld>
@@ -6935,21 +6866,46 @@
           <a:lstStyle/>
           <a:p>
             <a:r>
-              <a:rPr lang="it-IT" dirty="0" smtClean="0"/>
-              <a:t>Ci SERVER</a:t>
+              <a:rPr lang="it-IT" smtClean="0"/>
+              <a:t>Deploy automatico</a:t>
             </a:r>
             <a:endParaRPr lang="it-IT" dirty="0"/>
           </a:p>
         </p:txBody>
       </p:sp>
-      <p:sp>
-        <p:nvSpPr>
-          <p:cNvPr id="3" name="Subtitle 2"/>
+      <p:pic>
+        <p:nvPicPr>
+          <p:cNvPr id="12" name="Picture Placeholder 11"/>
+          <p:cNvPicPr>
+            <a:picLocks noGrp="1" noChangeAspect="1"/>
+          </p:cNvPicPr>
+          <p:nvPr>
+            <p:ph type="pic" sz="quarter" idx="11"/>
+          </p:nvPr>
+        </p:nvPicPr>
+        <p:blipFill>
+          <a:blip r:embed="rId2">
+            <a:extLst>
+              <a:ext uri="{28A0092B-C50C-407E-A947-70E740481C1C}">
+                <a14:useLocalDpi xmlns:a14="http://schemas.microsoft.com/office/drawing/2010/main" val="0"/>
+              </a:ext>
+            </a:extLst>
+          </a:blip>
+          <a:srcRect t="3008" b="3008"/>
+          <a:stretch>
+            <a:fillRect/>
+          </a:stretch>
+        </p:blipFill>
+        <p:spPr/>
+      </p:pic>
+      <p:sp>
+        <p:nvSpPr>
+          <p:cNvPr id="4" name="Subtitle 3"/>
           <p:cNvSpPr>
             <a:spLocks noGrp="1"/>
           </p:cNvSpPr>
           <p:nvPr>
-            <p:ph type="subTitle" idx="1"/>
+            <p:ph type="subTitle" idx="12"/>
           </p:nvPr>
         </p:nvSpPr>
         <p:spPr/>
@@ -6959,96 +6915,30 @@
           <a:p>
             <a:r>
               <a:rPr lang="it-IT" dirty="0" smtClean="0"/>
-              <a:t>Integration flow</a:t>
+              <a:t>Da sviluppo a ...</a:t>
             </a:r>
             <a:endParaRPr lang="it-IT" dirty="0"/>
-          </a:p>
-        </p:txBody>
-      </p:sp>
-      <p:sp>
-        <p:nvSpPr>
-          <p:cNvPr id="8" name="Content Placeholder 7"/>
-          <p:cNvSpPr>
-            <a:spLocks noGrp="1"/>
-          </p:cNvSpPr>
-          <p:nvPr>
-            <p:ph idx="10"/>
-          </p:nvPr>
-        </p:nvSpPr>
-        <p:spPr>
-          <a:xfrm>
-            <a:off x="603248" y="1594892"/>
-            <a:ext cx="7937501" cy="2983686"/>
-          </a:xfrm>
-        </p:spPr>
-        <p:txBody>
-          <a:bodyPr/>
-          <a:lstStyle/>
-          <a:p>
-            <a:pPr marL="0" indent="0" algn="ctr">
-              <a:buNone/>
-            </a:pPr>
-            <a:r>
-              <a:rPr lang="it-IT" dirty="0" smtClean="0"/>
-              <a:t>Server che ospita e supporta l’esecuzione della pipeline di Continuous Integration.</a:t>
-            </a:r>
-          </a:p>
-          <a:p>
-            <a:pPr marL="0" indent="0" algn="ctr">
-              <a:buNone/>
-            </a:pPr>
-            <a:endParaRPr lang="it-IT" dirty="0" smtClean="0"/>
-          </a:p>
-          <a:p>
-            <a:pPr marL="0" indent="0">
-              <a:buNone/>
-            </a:pPr>
-            <a:r>
-              <a:rPr lang="it-IT" dirty="0" smtClean="0"/>
-              <a:t>Ampia scelta: servizi open source, enterprise, specifici per VSC, con supporto per lo scaling, container, plugin, ...</a:t>
-            </a:r>
-            <a:endParaRPr lang="it-IT" dirty="0"/>
-          </a:p>
-          <a:p>
-            <a:pPr marL="0" indent="0">
-              <a:buNone/>
-            </a:pPr>
-            <a:r>
-              <a:rPr lang="it-IT" dirty="0" smtClean="0"/>
-              <a:t>In questo periodo ho sperimentato GitLabCI, TravisCI, Bamboo, Go, TeamCity, CircleCI.</a:t>
-            </a:r>
-          </a:p>
-          <a:p>
-            <a:pPr marL="0" indent="0" algn="ctr">
-              <a:buNone/>
-            </a:pPr>
-            <a:r>
-              <a:rPr lang="it-IT" dirty="0" smtClean="0"/>
-              <a:t>Scelta finale su </a:t>
-            </a:r>
-            <a:r>
-              <a:rPr lang="it-IT" b="1" cap="all" dirty="0">
-                <a:solidFill>
-                  <a:schemeClr val="tx2"/>
-                </a:solidFill>
-                <a:latin typeface="Arial"/>
-                <a:cs typeface="Arial"/>
-              </a:rPr>
-              <a:t>Jenkins</a:t>
-            </a:r>
           </a:p>
         </p:txBody>
       </p:sp>
     </p:spTree>
     <p:extLst>
       <p:ext uri="{BB962C8B-B14F-4D97-AF65-F5344CB8AC3E}">
-        <p14:creationId xmlns:p14="http://schemas.microsoft.com/office/powerpoint/2010/main" val="556143459"/>
+        <p14:creationId xmlns:p14="http://schemas.microsoft.com/office/powerpoint/2010/main" val="2163965852"/>
       </p:ext>
     </p:extLst>
   </p:cSld>
   <p:clrMapOvr>
     <a:masterClrMapping/>
   </p:clrMapOvr>
+  <mc:AlternateContent xmlns:mc="http://schemas.openxmlformats.org/markup-compatibility/2006" xmlns:p14="http://schemas.microsoft.com/office/powerpoint/2010/main">
+    <mc:Choice Requires="p14">
+      <p:transition spd="slow" p14:dur="2000"/>
+    </mc:Choice>
+    <mc:Fallback xmlns="">
+      <p:transition spd="slow"/>
+    </mc:Fallback>
+  </mc:AlternateContent>
   <p:timing>
     <p:tnLst>
       <p:par>
@@ -7078,113 +6968,7 @@
       </p:grpSpPr>
       <p:sp>
         <p:nvSpPr>
-          <p:cNvPr id="2" name="Content Placeholder 1"/>
-          <p:cNvSpPr>
-            <a:spLocks noGrp="1"/>
-          </p:cNvSpPr>
-          <p:nvPr>
-            <p:ph sz="half" idx="1"/>
-          </p:nvPr>
-        </p:nvSpPr>
-        <p:spPr>
-          <a:xfrm>
-            <a:off x="573853" y="1364992"/>
-            <a:ext cx="3366620" cy="3140927"/>
-          </a:xfrm>
-        </p:spPr>
-        <p:txBody>
-          <a:bodyPr/>
-          <a:lstStyle/>
-          <a:p>
-            <a:pPr marL="285750" indent="-285750">
-              <a:buFont typeface="Arial" panose="020B0604020202020204" pitchFamily="34" charset="0"/>
-              <a:buChar char="•"/>
-            </a:pPr>
-            <a:r>
-              <a:rPr lang="it-IT" dirty="0" smtClean="0"/>
-              <a:t>Sviluppato da CloudBees, disponibile in versione Enterprise e </a:t>
-            </a:r>
-            <a:r>
-              <a:rPr lang="it-IT" sz="1800" b="1" cap="all" dirty="0">
-                <a:solidFill>
-                  <a:schemeClr val="tx2"/>
-                </a:solidFill>
-                <a:latin typeface="Arial"/>
-                <a:cs typeface="Arial"/>
-              </a:rPr>
-              <a:t>Open Source </a:t>
-            </a:r>
-            <a:r>
-              <a:rPr lang="it-IT" dirty="0" smtClean="0"/>
-              <a:t>(self – hosted)</a:t>
-            </a:r>
-          </a:p>
-          <a:p>
-            <a:pPr marL="285750" indent="-285750">
-              <a:buFont typeface="Arial" panose="020B0604020202020204" pitchFamily="34" charset="0"/>
-              <a:buChar char="•"/>
-            </a:pPr>
-            <a:endParaRPr lang="it-IT" dirty="0" smtClean="0"/>
-          </a:p>
-          <a:p>
-            <a:pPr marL="285750" indent="-285750">
-              <a:buFont typeface="Arial" panose="020B0604020202020204" pitchFamily="34" charset="0"/>
-              <a:buChar char="•"/>
-            </a:pPr>
-            <a:r>
-              <a:rPr lang="it-IT" dirty="0" smtClean="0"/>
-              <a:t>Totalmente customizzabile in base alle proprie esigenze grazie all’ecosistema di </a:t>
-            </a:r>
-            <a:r>
-              <a:rPr lang="it-IT" sz="1800" b="1" cap="all" dirty="0">
-                <a:solidFill>
-                  <a:schemeClr val="tx2"/>
-                </a:solidFill>
-                <a:latin typeface="Arial"/>
-                <a:cs typeface="Arial"/>
-              </a:rPr>
-              <a:t>plugins</a:t>
-            </a:r>
-          </a:p>
-          <a:p>
-            <a:pPr marL="285750" indent="-285750">
-              <a:buFont typeface="Arial" panose="020B0604020202020204" pitchFamily="34" charset="0"/>
-              <a:buChar char="•"/>
-            </a:pPr>
-            <a:endParaRPr lang="it-IT" dirty="0" smtClean="0"/>
-          </a:p>
-          <a:p>
-            <a:pPr marL="285750" indent="-285750">
-              <a:buFont typeface="Arial" panose="020B0604020202020204" pitchFamily="34" charset="0"/>
-              <a:buChar char="•"/>
-            </a:pPr>
-            <a:r>
-              <a:rPr lang="it-IT" dirty="0" smtClean="0"/>
-              <a:t>Integrabile con servizi esterni tramite </a:t>
-            </a:r>
-            <a:r>
-              <a:rPr lang="it-IT" sz="1800" b="1" cap="all" dirty="0">
-                <a:solidFill>
-                  <a:schemeClr val="tx2"/>
-                </a:solidFill>
-                <a:latin typeface="Arial"/>
-                <a:cs typeface="Arial"/>
-              </a:rPr>
-              <a:t>webhook</a:t>
-            </a:r>
-          </a:p>
-          <a:p>
-            <a:pPr marL="285750" indent="-285750">
-              <a:buFont typeface="Arial" panose="020B0604020202020204" pitchFamily="34" charset="0"/>
-              <a:buChar char="•"/>
-            </a:pPr>
-            <a:endParaRPr lang="it-IT" dirty="0"/>
-          </a:p>
-        </p:txBody>
-      </p:sp>
-      <p:sp>
-        <p:nvSpPr>
-          <p:cNvPr id="3" name="Title 2"/>
+          <p:cNvPr id="2" name="Title 1"/>
           <p:cNvSpPr>
             <a:spLocks noGrp="1"/>
           </p:cNvSpPr>
@@ -7198,46 +6982,21 @@
           <a:lstStyle/>
           <a:p>
             <a:r>
-              <a:rPr lang="it-IT" dirty="0" smtClean="0"/>
-              <a:t>jenkins</a:t>
+              <a:rPr lang="it-IT" smtClean="0"/>
+              <a:t>Deploy automatico</a:t>
             </a:r>
             <a:endParaRPr lang="it-IT" dirty="0"/>
           </a:p>
         </p:txBody>
       </p:sp>
-      <p:pic>
-        <p:nvPicPr>
-          <p:cNvPr id="6" name="Picture Placeholder 5"/>
-          <p:cNvPicPr>
-            <a:picLocks noGrp="1" noChangeAspect="1"/>
-          </p:cNvPicPr>
-          <p:nvPr>
-            <p:ph type="pic" sz="quarter" idx="11"/>
-          </p:nvPr>
-        </p:nvPicPr>
-        <p:blipFill>
-          <a:blip r:embed="rId2">
-            <a:extLst>
-              <a:ext uri="{28A0092B-C50C-407E-A947-70E740481C1C}">
-                <a14:useLocalDpi xmlns:a14="http://schemas.microsoft.com/office/drawing/2010/main" val="0"/>
-              </a:ext>
-            </a:extLst>
-          </a:blip>
-          <a:srcRect l="7867" r="7867"/>
-          <a:stretch>
-            <a:fillRect/>
-          </a:stretch>
-        </p:blipFill>
-        <p:spPr/>
-      </p:pic>
-      <p:sp>
-        <p:nvSpPr>
-          <p:cNvPr id="5" name="Subtitle 4"/>
+      <p:sp>
+        <p:nvSpPr>
+          <p:cNvPr id="3" name="Text Placeholder 2"/>
           <p:cNvSpPr>
             <a:spLocks noGrp="1"/>
           </p:cNvSpPr>
           <p:nvPr>
-            <p:ph type="subTitle" idx="12"/>
+            <p:ph type="body" sz="quarter" idx="10"/>
           </p:nvPr>
         </p:nvSpPr>
         <p:spPr/>
@@ -7247,7 +7006,122 @@
           <a:p>
             <a:r>
               <a:rPr lang="it-IT" dirty="0" smtClean="0"/>
-              <a:t>Continuous integration server</a:t>
+              <a:t>Deploy Automatico </a:t>
+            </a:r>
+            <a:r>
+              <a:rPr lang="it-IT" cap="all" dirty="0">
+                <a:solidFill>
+                  <a:schemeClr val="tx2"/>
+                </a:solidFill>
+                <a:cs typeface="Arial"/>
+              </a:rPr>
+              <a:t>per ogni ambiente della pipeline </a:t>
+            </a:r>
+            <a:r>
+              <a:rPr lang="it-IT" dirty="0" smtClean="0"/>
+              <a:t>!!</a:t>
+            </a:r>
+          </a:p>
+          <a:p>
+            <a:pPr marL="285750" indent="-285750">
+              <a:buFont typeface="Arial" panose="020B0604020202020204" pitchFamily="34" charset="0"/>
+              <a:buChar char="•"/>
+            </a:pPr>
+            <a:r>
+              <a:rPr lang="it-IT" dirty="0" smtClean="0"/>
+              <a:t>Sviluppo</a:t>
+            </a:r>
+          </a:p>
+          <a:p>
+            <a:pPr marL="285750" indent="-285750">
+              <a:buFont typeface="Arial" panose="020B0604020202020204" pitchFamily="34" charset="0"/>
+              <a:buChar char="•"/>
+            </a:pPr>
+            <a:r>
+              <a:rPr lang="it-IT" dirty="0" smtClean="0"/>
+              <a:t>Test</a:t>
+            </a:r>
+          </a:p>
+          <a:p>
+            <a:pPr marL="285750" indent="-285750">
+              <a:buFont typeface="Arial" panose="020B0604020202020204" pitchFamily="34" charset="0"/>
+              <a:buChar char="•"/>
+            </a:pPr>
+            <a:r>
+              <a:rPr lang="it-IT" dirty="0" smtClean="0"/>
+              <a:t>Acceptance</a:t>
+            </a:r>
+          </a:p>
+          <a:p>
+            <a:pPr marL="285750" indent="-285750">
+              <a:buFont typeface="Arial" panose="020B0604020202020204" pitchFamily="34" charset="0"/>
+              <a:buChar char="•"/>
+            </a:pPr>
+            <a:r>
+              <a:rPr lang="it-IT" dirty="0" smtClean="0"/>
+              <a:t>...</a:t>
+            </a:r>
+          </a:p>
+          <a:p>
+            <a:pPr marL="285750" indent="-285750">
+              <a:buFont typeface="Arial" panose="020B0604020202020204" pitchFamily="34" charset="0"/>
+              <a:buChar char="•"/>
+            </a:pPr>
+            <a:r>
+              <a:rPr lang="it-IT" dirty="0" smtClean="0"/>
+              <a:t>Pre-prod</a:t>
+            </a:r>
+          </a:p>
+          <a:p>
+            <a:pPr marL="285750" indent="-285750">
+              <a:buFont typeface="Arial" panose="020B0604020202020204" pitchFamily="34" charset="0"/>
+              <a:buChar char="•"/>
+            </a:pPr>
+            <a:r>
+              <a:rPr lang="it-IT" dirty="0" smtClean="0"/>
+              <a:t>Produzione</a:t>
+            </a:r>
+          </a:p>
+          <a:p>
+            <a:endParaRPr lang="it-IT" dirty="0"/>
+          </a:p>
+          <a:p>
+            <a:pPr algn="ctr"/>
+            <a:r>
+              <a:rPr lang="it-IT" b="1" cap="all" dirty="0">
+                <a:solidFill>
+                  <a:schemeClr val="tx2"/>
+                </a:solidFill>
+                <a:cs typeface="Arial"/>
+              </a:rPr>
+              <a:t>Test del Deploy Automatico </a:t>
+            </a:r>
+            <a:r>
+              <a:rPr lang="it-IT" dirty="0" smtClean="0"/>
+              <a:t>in parallelo ai Test del codice</a:t>
+            </a:r>
+            <a:endParaRPr lang="it-IT" dirty="0"/>
+          </a:p>
+        </p:txBody>
+      </p:sp>
+      <p:sp>
+        <p:nvSpPr>
+          <p:cNvPr id="4" name="Subtitle 3"/>
+          <p:cNvSpPr>
+            <a:spLocks noGrp="1"/>
+          </p:cNvSpPr>
+          <p:nvPr>
+            <p:ph type="subTitle" idx="1"/>
+          </p:nvPr>
+        </p:nvSpPr>
+        <p:spPr/>
+        <p:txBody>
+          <a:bodyPr/>
+          <a:lstStyle/>
+          <a:p>
+            <a:r>
+              <a:rPr lang="it-IT" dirty="0" smtClean="0"/>
+              <a:t>Da sviluppo a ...</a:t>
             </a:r>
             <a:endParaRPr lang="it-IT" dirty="0"/>
           </a:p>
@@ -7256,13 +7130,21 @@
     </p:spTree>
     <p:extLst>
       <p:ext uri="{BB962C8B-B14F-4D97-AF65-F5344CB8AC3E}">
-        <p14:creationId xmlns:p14="http://schemas.microsoft.com/office/powerpoint/2010/main" val="527600286"/>
+        <p14:creationId xmlns:p14="http://schemas.microsoft.com/office/powerpoint/2010/main" val="1930734996"/>
       </p:ext>
     </p:extLst>
   </p:cSld>
   <p:clrMapOvr>
     <a:masterClrMapping/>
   </p:clrMapOvr>
+  <mc:AlternateContent xmlns:mc="http://schemas.openxmlformats.org/markup-compatibility/2006" xmlns:p14="http://schemas.microsoft.com/office/powerpoint/2010/main">
+    <mc:Choice Requires="p14">
+      <p:transition spd="slow" p14:dur="2000"/>
+    </mc:Choice>
+    <mc:Fallback xmlns="">
+      <p:transition spd="slow"/>
+    </mc:Fallback>
+  </mc:AlternateContent>
   <p:timing>
     <p:tnLst>
       <p:par>
@@ -7292,7 +7174,7 @@
       </p:grpSpPr>
       <p:sp>
         <p:nvSpPr>
-          <p:cNvPr id="3" name="Title 2"/>
+          <p:cNvPr id="2" name="Title 1"/>
           <p:cNvSpPr>
             <a:spLocks noGrp="1"/>
           </p:cNvSpPr>
@@ -7306,8 +7188,8 @@
           <a:lstStyle/>
           <a:p>
             <a:r>
-              <a:rPr lang="it-IT" dirty="0" smtClean="0"/>
-              <a:t>jenkins</a:t>
+              <a:rPr lang="it-IT" smtClean="0"/>
+              <a:t>Deploy automatico</a:t>
             </a:r>
             <a:endParaRPr lang="it-IT" dirty="0"/>
           </a:p>
@@ -7315,12 +7197,12 @@
       </p:sp>
       <p:sp>
         <p:nvSpPr>
-          <p:cNvPr id="5" name="Subtitle 4"/>
+          <p:cNvPr id="4" name="Subtitle 3"/>
           <p:cNvSpPr>
             <a:spLocks noGrp="1"/>
           </p:cNvSpPr>
           <p:nvPr>
-            <p:ph type="subTitle" idx="1"/>
+            <p:ph type="subTitle" idx="12"/>
           </p:nvPr>
         </p:nvSpPr>
         <p:spPr/>
@@ -7330,149 +7212,55 @@
           <a:p>
             <a:r>
               <a:rPr lang="it-IT" dirty="0" smtClean="0"/>
-              <a:t>Continuous integration server</a:t>
+              <a:t>Da sviluppo a ...</a:t>
             </a:r>
             <a:endParaRPr lang="it-IT" dirty="0"/>
           </a:p>
         </p:txBody>
       </p:sp>
-      <p:sp>
-        <p:nvSpPr>
-          <p:cNvPr id="6" name="Content Placeholder 5"/>
-          <p:cNvSpPr>
-            <a:spLocks noGrp="1"/>
-          </p:cNvSpPr>
+      <p:pic>
+        <p:nvPicPr>
+          <p:cNvPr id="5" name="Picture Placeholder 4"/>
+          <p:cNvPicPr>
+            <a:picLocks noGrp="1" noChangeAspect="1"/>
+          </p:cNvPicPr>
           <p:nvPr>
-            <p:ph idx="10"/>
+            <p:ph type="pic" sz="quarter" idx="11"/>
           </p:nvPr>
-        </p:nvSpPr>
-        <p:spPr>
-          <a:xfrm>
-            <a:off x="604514" y="1292285"/>
-            <a:ext cx="7937501" cy="3358656"/>
-          </a:xfrm>
-        </p:spPr>
-        <p:txBody>
-          <a:bodyPr/>
-          <a:lstStyle/>
-          <a:p>
-            <a:pPr marL="0" indent="0">
-              <a:buNone/>
-            </a:pPr>
-            <a:r>
-              <a:rPr lang="it-IT" dirty="0" smtClean="0"/>
-              <a:t>Pipeline definita tramite il </a:t>
-            </a:r>
-            <a:r>
-              <a:rPr lang="it-IT" b="1" cap="all" dirty="0">
-                <a:solidFill>
-                  <a:schemeClr val="tx2"/>
-                </a:solidFill>
-                <a:latin typeface="Arial"/>
-                <a:cs typeface="Arial"/>
-              </a:rPr>
-              <a:t>Jenkinsfile</a:t>
-            </a:r>
-            <a:r>
-              <a:rPr lang="it-IT" dirty="0" smtClean="0"/>
-              <a:t>:</a:t>
-            </a:r>
-          </a:p>
-          <a:p>
-            <a:pPr marL="285750" indent="-285750">
-              <a:buFont typeface="Arial" panose="020B0604020202020204" pitchFamily="34" charset="0"/>
-              <a:buChar char="•"/>
-            </a:pPr>
-            <a:r>
-              <a:rPr lang="it-IT" dirty="0" smtClean="0"/>
-              <a:t>Scritto in </a:t>
-            </a:r>
-            <a:r>
-              <a:rPr lang="it-IT" cap="all" dirty="0">
-                <a:solidFill>
-                  <a:schemeClr val="tx2"/>
-                </a:solidFill>
-                <a:latin typeface="Arial"/>
-                <a:cs typeface="Arial"/>
-              </a:rPr>
-              <a:t>groovy</a:t>
-            </a:r>
-            <a:r>
-              <a:rPr lang="it-IT" dirty="0" smtClean="0"/>
-              <a:t>, DSL simile al python</a:t>
-            </a:r>
-          </a:p>
-          <a:p>
-            <a:pPr marL="285750" indent="-285750">
-              <a:buFont typeface="Arial" panose="020B0604020202020204" pitchFamily="34" charset="0"/>
-              <a:buChar char="•"/>
-            </a:pPr>
-            <a:r>
-              <a:rPr lang="it-IT" dirty="0" smtClean="0"/>
-              <a:t>Contenuto nel progetto da integrare</a:t>
-            </a:r>
-          </a:p>
-          <a:p>
-            <a:pPr marL="285750" indent="-285750">
-              <a:buFont typeface="Arial" panose="020B0604020202020204" pitchFamily="34" charset="0"/>
-              <a:buChar char="•"/>
-            </a:pPr>
-            <a:r>
-              <a:rPr lang="it-IT" dirty="0" smtClean="0"/>
-              <a:t>Pipeline diverse per diversi Branch</a:t>
-            </a:r>
-          </a:p>
-          <a:p>
-            <a:pPr marL="285750" indent="-285750">
-              <a:buFont typeface="Arial" panose="020B0604020202020204" pitchFamily="34" charset="0"/>
-              <a:buChar char="•"/>
-            </a:pPr>
-            <a:r>
-              <a:rPr lang="it-IT" cap="all" dirty="0">
-                <a:solidFill>
-                  <a:schemeClr val="tx2"/>
-                </a:solidFill>
-                <a:latin typeface="Arial"/>
-                <a:cs typeface="Arial"/>
-              </a:rPr>
-              <a:t>Condivisione</a:t>
-            </a:r>
-            <a:r>
-              <a:rPr lang="it-IT" dirty="0" smtClean="0"/>
-              <a:t> trasparente del processo di sviluppo all’interno del team</a:t>
-            </a:r>
-          </a:p>
-          <a:p>
-            <a:pPr marL="285750" indent="-285750">
-              <a:buFont typeface="Arial" panose="020B0604020202020204" pitchFamily="34" charset="0"/>
-              <a:buChar char="•"/>
-            </a:pPr>
-            <a:r>
-              <a:rPr lang="it-IT" dirty="0" smtClean="0"/>
-              <a:t>Possibilità </a:t>
-            </a:r>
-            <a:r>
-              <a:rPr lang="it-IT" smtClean="0"/>
-              <a:t>di esecuzione </a:t>
-            </a:r>
-            <a:r>
-              <a:rPr lang="it-IT" dirty="0" smtClean="0"/>
-              <a:t>in container Docker configurato «On the Fly»</a:t>
-            </a:r>
-            <a:endParaRPr lang="it-IT" dirty="0"/>
-          </a:p>
-        </p:txBody>
-      </p:sp>
+        </p:nvPicPr>
+        <p:blipFill>
+          <a:blip r:embed="rId2">
+            <a:extLst>
+              <a:ext uri="{28A0092B-C50C-407E-A947-70E740481C1C}">
+                <a14:useLocalDpi xmlns:a14="http://schemas.microsoft.com/office/drawing/2010/main" val="0"/>
+              </a:ext>
+            </a:extLst>
+          </a:blip>
+          <a:srcRect t="3008" b="3008"/>
+          <a:stretch>
+            <a:fillRect/>
+          </a:stretch>
+        </p:blipFill>
+        <p:spPr/>
+      </p:pic>
     </p:spTree>
     <p:extLst>
       <p:ext uri="{BB962C8B-B14F-4D97-AF65-F5344CB8AC3E}">
-        <p14:creationId xmlns:p14="http://schemas.microsoft.com/office/powerpoint/2010/main" val="591274863"/>
+        <p14:creationId xmlns:p14="http://schemas.microsoft.com/office/powerpoint/2010/main" val="2798060661"/>
       </p:ext>
     </p:extLst>
   </p:cSld>
   <p:clrMapOvr>
     <a:masterClrMapping/>
   </p:clrMapOvr>
+  <mc:AlternateContent xmlns:mc="http://schemas.openxmlformats.org/markup-compatibility/2006" xmlns:p14="http://schemas.microsoft.com/office/powerpoint/2010/main">
+    <mc:Choice Requires="p14">
+      <p:transition spd="slow" p14:dur="2000"/>
+    </mc:Choice>
+    <mc:Fallback xmlns="">
+      <p:transition spd="slow"/>
+    </mc:Fallback>
+  </mc:AlternateContent>
   <p:timing>
     <p:tnLst>
       <p:par>
@@ -7500,6 +7288,35 @@
           <a:chExt cx="0" cy="0"/>
         </a:xfrm>
       </p:grpSpPr>
+      <p:pic>
+        <p:nvPicPr>
+          <p:cNvPr id="7" name="Content Placeholder 6"/>
+          <p:cNvPicPr>
+            <a:picLocks noGrp="1" noChangeAspect="1"/>
+          </p:cNvPicPr>
+          <p:nvPr>
+            <p:ph sz="half" idx="1"/>
+          </p:nvPr>
+        </p:nvPicPr>
+        <p:blipFill>
+          <a:blip r:embed="rId2">
+            <a:extLst>
+              <a:ext uri="{28A0092B-C50C-407E-A947-70E740481C1C}">
+                <a14:useLocalDpi xmlns:a14="http://schemas.microsoft.com/office/drawing/2010/main" val="0"/>
+              </a:ext>
+            </a:extLst>
+          </a:blip>
+          <a:stretch>
+            <a:fillRect/>
+          </a:stretch>
+        </p:blipFill>
+        <p:spPr>
+          <a:xfrm>
+            <a:off x="0" y="2038882"/>
+            <a:ext cx="4361491" cy="1482601"/>
+          </a:xfrm>
+        </p:spPr>
+      </p:pic>
       <p:sp>
         <p:nvSpPr>
           <p:cNvPr id="3" name="Title 2"/>
@@ -7517,142 +7334,42 @@
           <a:p>
             <a:r>
               <a:rPr lang="it-IT" dirty="0" smtClean="0"/>
-              <a:t>DECLARATIVE PIPELINE</a:t>
+              <a:t>Estendere la pipeline</a:t>
             </a:r>
             <a:endParaRPr lang="it-IT" dirty="0"/>
           </a:p>
         </p:txBody>
       </p:sp>
-      <p:sp>
-        <p:nvSpPr>
-          <p:cNvPr id="6" name="Content Placeholder 5"/>
-          <p:cNvSpPr>
-            <a:spLocks noGrp="1"/>
-          </p:cNvSpPr>
+      <p:pic>
+        <p:nvPicPr>
+          <p:cNvPr id="6" name="Picture Placeholder 5"/>
+          <p:cNvPicPr>
+            <a:picLocks noGrp="1" noChangeAspect="1"/>
+          </p:cNvPicPr>
           <p:nvPr>
-            <p:ph type="body" sz="quarter" idx="10"/>
+            <p:ph type="pic" sz="quarter" idx="11"/>
           </p:nvPr>
-        </p:nvSpPr>
-        <p:spPr/>
-        <p:txBody>
-          <a:bodyPr/>
-          <a:lstStyle/>
-          <a:p>
-            <a:pPr marL="0" indent="0">
-              <a:buNone/>
-            </a:pPr>
-            <a:endParaRPr lang="it-IT" sz="1600" dirty="0" smtClean="0"/>
-          </a:p>
-          <a:p>
-            <a:pPr marL="0" indent="0">
-              <a:buNone/>
-            </a:pPr>
-            <a:r>
-              <a:rPr lang="it-IT" sz="1600" dirty="0" smtClean="0"/>
-              <a:t>Keyword </a:t>
-            </a:r>
-            <a:r>
-              <a:rPr lang="it-IT" sz="1600" i="1" dirty="0" smtClean="0"/>
-              <a:t>«pipeline», </a:t>
-            </a:r>
-            <a:r>
-              <a:rPr lang="it-IT" sz="1600" dirty="0" smtClean="0"/>
-              <a:t>flusso di esecuzione come sequenza di </a:t>
-            </a:r>
-            <a:r>
-              <a:rPr lang="it-IT" b="1" cap="all" dirty="0">
-                <a:solidFill>
-                  <a:schemeClr val="tx2"/>
-                </a:solidFill>
-                <a:latin typeface="Arial"/>
-                <a:cs typeface="Arial"/>
-              </a:rPr>
-              <a:t>Stages</a:t>
-            </a:r>
-            <a:r>
-              <a:rPr lang="it-IT" sz="1600" dirty="0" smtClean="0"/>
-              <a:t>, definiti tramite il DSL Groovy</a:t>
-            </a:r>
-          </a:p>
-          <a:p>
-            <a:pPr marL="0" indent="0">
-              <a:buNone/>
-            </a:pPr>
-            <a:endParaRPr lang="it-IT" sz="1600" dirty="0"/>
-          </a:p>
-          <a:p>
-            <a:pPr marL="285750" indent="-285750">
-              <a:buFont typeface="Arial" panose="020B0604020202020204" pitchFamily="34" charset="0"/>
-              <a:buChar char="•"/>
-            </a:pPr>
-            <a:r>
-              <a:rPr lang="it-IT" sz="1600" dirty="0" smtClean="0"/>
-              <a:t>Massima astrazione</a:t>
-            </a:r>
-          </a:p>
-          <a:p>
-            <a:pPr marL="285750" indent="-285750">
-              <a:buFont typeface="Arial" panose="020B0604020202020204" pitchFamily="34" charset="0"/>
-              <a:buChar char="•"/>
-            </a:pPr>
-            <a:r>
-              <a:rPr lang="it-IT" sz="1600" dirty="0" smtClean="0"/>
-              <a:t>Facile comprensione da tutto il team</a:t>
-            </a:r>
-          </a:p>
-          <a:p>
-            <a:pPr marL="285750" indent="-285750">
-              <a:buFont typeface="Arial" panose="020B0604020202020204" pitchFamily="34" charset="0"/>
-              <a:buChar char="•"/>
-            </a:pPr>
-            <a:r>
-              <a:rPr lang="it-IT" sz="1600" dirty="0" smtClean="0"/>
-              <a:t>Editor grafico di supporto (</a:t>
-            </a:r>
-            <a:r>
-              <a:rPr lang="it-IT" b="1" cap="all" dirty="0" smtClean="0">
-                <a:solidFill>
-                  <a:schemeClr val="tx2"/>
-                </a:solidFill>
-                <a:latin typeface="Arial"/>
-                <a:cs typeface="Arial"/>
-              </a:rPr>
-              <a:t>Blue </a:t>
-            </a:r>
-            <a:r>
-              <a:rPr lang="it-IT" b="1" cap="all" dirty="0">
-                <a:solidFill>
-                  <a:schemeClr val="tx2"/>
-                </a:solidFill>
-                <a:latin typeface="Arial"/>
-                <a:cs typeface="Arial"/>
-              </a:rPr>
-              <a:t>Ocean</a:t>
-            </a:r>
-            <a:r>
-              <a:rPr lang="it-IT" sz="1600" dirty="0" smtClean="0"/>
-              <a:t>)</a:t>
-            </a:r>
-          </a:p>
-          <a:p>
-            <a:pPr marL="285750" indent="-285750">
-              <a:buFont typeface="Arial" panose="020B0604020202020204" pitchFamily="34" charset="0"/>
-              <a:buChar char="•"/>
-            </a:pPr>
-            <a:endParaRPr lang="it-IT" sz="1600" dirty="0" smtClean="0"/>
-          </a:p>
-          <a:p>
-            <a:pPr marL="285750" indent="-285750">
-              <a:buFont typeface="Arial" panose="020B0604020202020204" pitchFamily="34" charset="0"/>
-              <a:buChar char="•"/>
-            </a:pPr>
-            <a:r>
-              <a:rPr lang="it-IT" sz="1600" dirty="0" smtClean="0"/>
-              <a:t>Necessità di Script per task complessi</a:t>
-            </a:r>
-          </a:p>
-        </p:txBody>
-      </p:sp>
+        </p:nvPicPr>
+        <p:blipFill>
+          <a:blip r:embed="rId3">
+            <a:extLst>
+              <a:ext uri="{28A0092B-C50C-407E-A947-70E740481C1C}">
+                <a14:useLocalDpi xmlns:a14="http://schemas.microsoft.com/office/drawing/2010/main" val="0"/>
+              </a:ext>
+            </a:extLst>
+          </a:blip>
+          <a:srcRect l="679" r="679"/>
+          <a:stretch>
+            <a:fillRect/>
+          </a:stretch>
+        </p:blipFill>
+        <p:spPr>
+          <a:xfrm>
+            <a:off x="4403084" y="1417012"/>
+            <a:ext cx="4740915" cy="2812909"/>
+          </a:xfrm>
+        </p:spPr>
+      </p:pic>
       <p:sp>
         <p:nvSpPr>
           <p:cNvPr id="5" name="Subtitle 4"/>
@@ -7660,7 +7377,7 @@
             <a:spLocks noGrp="1"/>
           </p:cNvSpPr>
           <p:nvPr>
-            <p:ph type="subTitle" idx="1"/>
+            <p:ph type="subTitle" idx="12"/>
           </p:nvPr>
         </p:nvSpPr>
         <p:spPr/>
@@ -7670,7 +7387,7 @@
           <a:p>
             <a:r>
               <a:rPr lang="it-IT" dirty="0" smtClean="0"/>
-              <a:t>Jenkinsfile style</a:t>
+              <a:t>Punto di scelta trasparente</a:t>
             </a:r>
             <a:endParaRPr lang="it-IT" dirty="0"/>
           </a:p>
@@ -7679,7 +7396,7 @@
     </p:spTree>
     <p:extLst>
       <p:ext uri="{BB962C8B-B14F-4D97-AF65-F5344CB8AC3E}">
-        <p14:creationId xmlns:p14="http://schemas.microsoft.com/office/powerpoint/2010/main" val="1129539609"/>
+        <p14:creationId xmlns:p14="http://schemas.microsoft.com/office/powerpoint/2010/main" val="3188836831"/>
       </p:ext>
     </p:extLst>
   </p:cSld>
@@ -7713,9 +7430,111 @@
           <a:chExt cx="0" cy="0"/>
         </a:xfrm>
       </p:grpSpPr>
-      <p:sp>
-        <p:nvSpPr>
-          <p:cNvPr id="3" name="Title 2"/>
+      <p:pic>
+        <p:nvPicPr>
+          <p:cNvPr id="10" name="Content Placeholder 9"/>
+          <p:cNvPicPr>
+            <a:picLocks noGrp="1" noChangeAspect="1"/>
+          </p:cNvPicPr>
+          <p:nvPr>
+            <p:ph sz="half" idx="1"/>
+          </p:nvPr>
+        </p:nvPicPr>
+        <p:blipFill>
+          <a:blip r:embed="rId2">
+            <a:extLst>
+              <a:ext uri="{28A0092B-C50C-407E-A947-70E740481C1C}">
+                <a14:useLocalDpi xmlns:a14="http://schemas.microsoft.com/office/drawing/2010/main" val="0"/>
+              </a:ext>
+            </a:extLst>
+          </a:blip>
+          <a:stretch>
+            <a:fillRect/>
+          </a:stretch>
+        </p:blipFill>
+        <p:spPr>
+          <a:xfrm>
+            <a:off x="626480" y="1161668"/>
+            <a:ext cx="3506043" cy="3750464"/>
+          </a:xfrm>
+        </p:spPr>
+      </p:pic>
+      <p:sp>
+        <p:nvSpPr>
+          <p:cNvPr id="9" name="Content Placeholder 8"/>
+          <p:cNvSpPr>
+            <a:spLocks noGrp="1"/>
+          </p:cNvSpPr>
+          <p:nvPr>
+            <p:ph sz="half" idx="2"/>
+          </p:nvPr>
+        </p:nvSpPr>
+        <p:spPr/>
+        <p:txBody>
+          <a:bodyPr/>
+          <a:lstStyle/>
+          <a:p>
+            <a:r>
+              <a:rPr lang="it-IT" sz="1800" b="1" cap="all" dirty="0">
+                <a:solidFill>
+                  <a:schemeClr val="tx2"/>
+                </a:solidFill>
+                <a:cs typeface="Arial"/>
+              </a:rPr>
+              <a:t>Features</a:t>
+            </a:r>
+          </a:p>
+          <a:p>
+            <a:r>
+              <a:rPr lang="it-IT" dirty="0" smtClean="0"/>
+              <a:t>Modulari e standalone</a:t>
+            </a:r>
+          </a:p>
+          <a:p>
+            <a:endParaRPr lang="it-IT" dirty="0"/>
+          </a:p>
+          <a:p>
+            <a:r>
+              <a:rPr lang="it-IT" sz="1800" b="1" cap="all" dirty="0">
+                <a:solidFill>
+                  <a:schemeClr val="tx2"/>
+                </a:solidFill>
+                <a:cs typeface="Arial"/>
+              </a:rPr>
+              <a:t>Toggle</a:t>
+            </a:r>
+          </a:p>
+          <a:p>
+            <a:r>
+              <a:rPr lang="it-IT" dirty="0" smtClean="0"/>
+              <a:t>Wrapper per ogni feature, permettono l’ On / Off trasparente</a:t>
+            </a:r>
+          </a:p>
+          <a:p>
+            <a:endParaRPr lang="it-IT" dirty="0"/>
+          </a:p>
+          <a:p>
+            <a:r>
+              <a:rPr lang="it-IT" sz="1800" b="1" cap="all" dirty="0">
+                <a:solidFill>
+                  <a:schemeClr val="tx2"/>
+                </a:solidFill>
+                <a:cs typeface="Arial"/>
+              </a:rPr>
+              <a:t>Agente esterno</a:t>
+            </a:r>
+          </a:p>
+          <a:p>
+            <a:r>
+              <a:rPr lang="it-IT" dirty="0" smtClean="0"/>
+              <a:t>Per abilitare le features (file di config, proxy, ... )</a:t>
+            </a:r>
+          </a:p>
+        </p:txBody>
+      </p:sp>
+      <p:sp>
+        <p:nvSpPr>
+          <p:cNvPr id="2" name="Title 1"/>
           <p:cNvSpPr>
             <a:spLocks noGrp="1"/>
           </p:cNvSpPr>
@@ -7729,8 +7548,8 @@
           <a:lstStyle/>
           <a:p>
             <a:r>
-              <a:rPr lang="it-IT" dirty="0" smtClean="0"/>
-              <a:t>SCRIPTED PIPELINE</a:t>
+              <a:rPr lang="it-IT" smtClean="0"/>
+              <a:t>Toggle features</a:t>
             </a:r>
             <a:endParaRPr lang="it-IT" dirty="0"/>
           </a:p>
@@ -7738,12 +7557,12 @@
       </p:sp>
       <p:sp>
         <p:nvSpPr>
-          <p:cNvPr id="6" name="Content Placeholder 5"/>
+          <p:cNvPr id="4" name="Subtitle 3"/>
           <p:cNvSpPr>
             <a:spLocks noGrp="1"/>
           </p:cNvSpPr>
           <p:nvPr>
-            <p:ph type="body" sz="quarter" idx="10"/>
+            <p:ph type="subTitle" idx="10"/>
           </p:nvPr>
         </p:nvSpPr>
         <p:spPr/>
@@ -7751,88 +7570,9 @@
           <a:bodyPr/>
           <a:lstStyle/>
           <a:p>
-            <a:pPr marL="0" indent="0">
-              <a:buNone/>
-            </a:pPr>
-            <a:endParaRPr lang="it-IT" sz="1600" dirty="0" smtClean="0"/>
-          </a:p>
-          <a:p>
-            <a:pPr marL="0" indent="0">
-              <a:buNone/>
-            </a:pPr>
-            <a:r>
-              <a:rPr lang="it-IT" sz="1600" dirty="0" smtClean="0"/>
-              <a:t>Keyword </a:t>
-            </a:r>
-            <a:r>
-              <a:rPr lang="it-IT" sz="1600" i="1" dirty="0" smtClean="0"/>
-              <a:t>«node», </a:t>
-            </a:r>
-            <a:r>
-              <a:rPr lang="it-IT" sz="1600" dirty="0" smtClean="0"/>
-              <a:t>estensione del DSL dichiarativo includendo costrutti tipici dei linguaggi imperativi.</a:t>
-            </a:r>
-          </a:p>
-          <a:p>
-            <a:pPr marL="0" indent="0">
-              <a:buNone/>
-            </a:pPr>
-            <a:endParaRPr lang="it-IT" sz="1600" dirty="0"/>
-          </a:p>
-          <a:p>
-            <a:pPr marL="285750" indent="-285750">
-              <a:buFont typeface="Arial" panose="020B0604020202020204" pitchFamily="34" charset="0"/>
-              <a:buChar char="•"/>
-            </a:pPr>
-            <a:r>
-              <a:rPr lang="it-IT" sz="1600" dirty="0" smtClean="0"/>
-              <a:t>Massimo controllo del flusso di esecuzione</a:t>
-            </a:r>
-          </a:p>
-          <a:p>
-            <a:pPr marL="285750" indent="-285750">
-              <a:buFont typeface="Arial" panose="020B0604020202020204" pitchFamily="34" charset="0"/>
-              <a:buChar char="•"/>
-            </a:pPr>
-            <a:endParaRPr lang="it-IT" sz="1600" dirty="0" smtClean="0"/>
-          </a:p>
-          <a:p>
-            <a:pPr marL="285750" indent="-285750">
-              <a:buFont typeface="Arial" panose="020B0604020202020204" pitchFamily="34" charset="0"/>
-              <a:buChar char="•"/>
-            </a:pPr>
-            <a:r>
-              <a:rPr lang="it-IT" sz="1600" dirty="0" smtClean="0"/>
-              <a:t>Neccessaria conoscenza del linguaggio</a:t>
-            </a:r>
-          </a:p>
-          <a:p>
-            <a:pPr marL="285750" indent="-285750">
-              <a:buFont typeface="Arial" panose="020B0604020202020204" pitchFamily="34" charset="0"/>
-              <a:buChar char="•"/>
-            </a:pPr>
-            <a:endParaRPr lang="it-IT" sz="1600" dirty="0" smtClean="0"/>
-          </a:p>
-        </p:txBody>
-      </p:sp>
-      <p:sp>
-        <p:nvSpPr>
-          <p:cNvPr id="5" name="Subtitle 4"/>
-          <p:cNvSpPr>
-            <a:spLocks noGrp="1"/>
-          </p:cNvSpPr>
-          <p:nvPr>
-            <p:ph type="subTitle" idx="1"/>
-          </p:nvPr>
-        </p:nvSpPr>
-        <p:spPr/>
-        <p:txBody>
-          <a:bodyPr/>
-          <a:lstStyle/>
-          <a:p>
-            <a:r>
-              <a:rPr lang="it-IT" dirty="0" smtClean="0"/>
-              <a:t>Jenkinsfile style</a:t>
+            <a:r>
+              <a:rPr lang="it-IT" smtClean="0"/>
+              <a:t>Gestire il release</a:t>
             </a:r>
             <a:endParaRPr lang="it-IT" dirty="0"/>
           </a:p>
@@ -7841,13 +7581,21 @@
     </p:spTree>
     <p:extLst>
       <p:ext uri="{BB962C8B-B14F-4D97-AF65-F5344CB8AC3E}">
-        <p14:creationId xmlns:p14="http://schemas.microsoft.com/office/powerpoint/2010/main" val="297111152"/>
+        <p14:creationId xmlns:p14="http://schemas.microsoft.com/office/powerpoint/2010/main" val="2219913400"/>
       </p:ext>
     </p:extLst>
   </p:cSld>
   <p:clrMapOvr>
     <a:masterClrMapping/>
   </p:clrMapOvr>
+  <mc:AlternateContent xmlns:mc="http://schemas.openxmlformats.org/markup-compatibility/2006" xmlns:p14="http://schemas.microsoft.com/office/powerpoint/2010/main">
+    <mc:Choice Requires="p14">
+      <p:transition spd="slow" p14:dur="2000"/>
+    </mc:Choice>
+    <mc:Fallback xmlns="">
+      <p:transition spd="slow"/>
+    </mc:Fallback>
+  </mc:AlternateContent>
   <p:timing>
     <p:tnLst>
       <p:par>
@@ -7877,7 +7625,116 @@
       </p:grpSpPr>
       <p:sp>
         <p:nvSpPr>
-          <p:cNvPr id="3" name="Title 2"/>
+          <p:cNvPr id="5" name="Content Placeholder 4"/>
+          <p:cNvSpPr>
+            <a:spLocks noGrp="1"/>
+          </p:cNvSpPr>
+          <p:nvPr>
+            <p:ph sz="half" idx="1"/>
+          </p:nvPr>
+        </p:nvSpPr>
+        <p:spPr>
+          <a:xfrm>
+            <a:off x="573852" y="1437651"/>
+            <a:ext cx="3340305" cy="3037283"/>
+          </a:xfrm>
+        </p:spPr>
+        <p:txBody>
+          <a:bodyPr/>
+          <a:lstStyle/>
+          <a:p>
+            <a:r>
+              <a:rPr lang="it-IT" dirty="0" smtClean="0"/>
+              <a:t>3 Ambienti di Rilascio di ogni Feature:</a:t>
+            </a:r>
+          </a:p>
+          <a:p>
+            <a:pPr marL="342900" indent="-342900">
+              <a:buFont typeface="+mj-lt"/>
+              <a:buAutoNum type="arabicPeriod"/>
+            </a:pPr>
+            <a:r>
+              <a:rPr lang="it-IT" dirty="0" smtClean="0"/>
+              <a:t>Tra i </a:t>
+            </a:r>
+            <a:r>
+              <a:rPr lang="it-IT" sz="1800" b="1" cap="all" dirty="0">
+                <a:solidFill>
+                  <a:schemeClr val="tx2"/>
+                </a:solidFill>
+                <a:cs typeface="Arial"/>
+              </a:rPr>
+              <a:t>dipendenti</a:t>
+            </a:r>
+            <a:r>
+              <a:rPr lang="it-IT" dirty="0" smtClean="0"/>
+              <a:t>, con bottone Abort.</a:t>
+            </a:r>
+          </a:p>
+          <a:p>
+            <a:pPr marL="342900" indent="-342900">
+              <a:buFont typeface="+mj-lt"/>
+              <a:buAutoNum type="arabicPeriod"/>
+            </a:pPr>
+            <a:endParaRPr lang="it-IT" dirty="0"/>
+          </a:p>
+          <a:p>
+            <a:pPr marL="342900" indent="-342900">
+              <a:buFont typeface="+mj-lt"/>
+              <a:buAutoNum type="arabicPeriod"/>
+            </a:pPr>
+            <a:r>
+              <a:rPr lang="it-IT" sz="1800" b="1" cap="all" dirty="0">
+                <a:solidFill>
+                  <a:schemeClr val="tx2"/>
+                </a:solidFill>
+                <a:cs typeface="Arial"/>
+              </a:rPr>
+              <a:t>2%</a:t>
+            </a:r>
+            <a:r>
+              <a:rPr lang="it-IT" dirty="0" smtClean="0"/>
+              <a:t> della produzione (Toggle Features), Monitoring prestazioni</a:t>
+            </a:r>
+          </a:p>
+          <a:p>
+            <a:pPr marL="342900" indent="-342900">
+              <a:buFont typeface="+mj-lt"/>
+              <a:buAutoNum type="arabicPeriod"/>
+            </a:pPr>
+            <a:endParaRPr lang="it-IT" dirty="0"/>
+          </a:p>
+          <a:p>
+            <a:pPr marL="342900" indent="-342900">
+              <a:buFont typeface="+mj-lt"/>
+              <a:buAutoNum type="arabicPeriod"/>
+            </a:pPr>
+            <a:r>
+              <a:rPr lang="it-IT" sz="1800" b="1" cap="all" dirty="0">
+                <a:solidFill>
+                  <a:schemeClr val="tx2"/>
+                </a:solidFill>
+                <a:cs typeface="Arial"/>
+              </a:rPr>
+              <a:t>100% </a:t>
+            </a:r>
+            <a:r>
+              <a:rPr lang="it-IT" dirty="0" smtClean="0"/>
+              <a:t>produzione, Monitoring completo</a:t>
+            </a:r>
+          </a:p>
+          <a:p>
+            <a:pPr marL="342900" indent="-342900">
+              <a:buFont typeface="+mj-lt"/>
+              <a:buAutoNum type="arabicPeriod"/>
+            </a:pPr>
+            <a:endParaRPr lang="it-IT" dirty="0" smtClean="0"/>
+          </a:p>
+        </p:txBody>
+      </p:sp>
+      <p:sp>
+        <p:nvSpPr>
+          <p:cNvPr id="2" name="Title 1"/>
           <p:cNvSpPr>
             <a:spLocks noGrp="1"/>
           </p:cNvSpPr>
@@ -7892,20 +7749,45 @@
           <a:p>
             <a:r>
               <a:rPr lang="it-IT" dirty="0" smtClean="0"/>
-              <a:t>Blue ocean</a:t>
+              <a:t>Dark launching</a:t>
             </a:r>
             <a:endParaRPr lang="it-IT" dirty="0"/>
           </a:p>
         </p:txBody>
       </p:sp>
-      <p:sp>
-        <p:nvSpPr>
-          <p:cNvPr id="6" name="Text Placeholder 5"/>
+      <p:pic>
+        <p:nvPicPr>
+          <p:cNvPr id="7" name="Picture Placeholder 6"/>
+          <p:cNvPicPr>
+            <a:picLocks noGrp="1" noChangeAspect="1"/>
+          </p:cNvPicPr>
+          <p:nvPr>
+            <p:ph type="pic" sz="quarter" idx="11"/>
+          </p:nvPr>
+        </p:nvPicPr>
+        <p:blipFill>
+          <a:blip r:embed="rId2">
+            <a:extLst>
+              <a:ext uri="{28A0092B-C50C-407E-A947-70E740481C1C}">
+                <a14:useLocalDpi xmlns:a14="http://schemas.microsoft.com/office/drawing/2010/main" val="0"/>
+              </a:ext>
+            </a:extLst>
+          </a:blip>
+          <a:srcRect l="2130" r="2130"/>
+          <a:stretch>
+            <a:fillRect/>
+          </a:stretch>
+        </p:blipFill>
+        <p:spPr/>
+      </p:pic>
+      <p:sp>
+        <p:nvSpPr>
+          <p:cNvPr id="4" name="Subtitle 3"/>
           <p:cNvSpPr>
             <a:spLocks noGrp="1"/>
           </p:cNvSpPr>
           <p:nvPr>
-            <p:ph type="body" sz="quarter" idx="10"/>
+            <p:ph type="subTitle" idx="12"/>
           </p:nvPr>
         </p:nvSpPr>
         <p:spPr/>
@@ -7915,103 +7797,7 @@
           <a:p>
             <a:r>
               <a:rPr lang="it-IT" dirty="0" smtClean="0"/>
-              <a:t>Restile dell’interfaccia grafica di Jenkins specifico per le </a:t>
-            </a:r>
-            <a:r>
-              <a:rPr lang="it-IT" b="1" cap="all" dirty="0">
-                <a:solidFill>
-                  <a:schemeClr val="tx2"/>
-                </a:solidFill>
-                <a:latin typeface="Arial"/>
-                <a:cs typeface="Arial"/>
-              </a:rPr>
-              <a:t>Pipeline Multibranch</a:t>
-            </a:r>
-          </a:p>
-          <a:p>
-            <a:pPr marL="285750" indent="-285750">
-              <a:buFont typeface="Arial" panose="020B0604020202020204" pitchFamily="34" charset="0"/>
-              <a:buChar char="•"/>
-            </a:pPr>
-            <a:endParaRPr lang="it-IT" dirty="0"/>
-          </a:p>
-          <a:p>
-            <a:pPr marL="285750" indent="-285750">
-              <a:buFont typeface="Arial" panose="020B0604020202020204" pitchFamily="34" charset="0"/>
-              <a:buChar char="•"/>
-            </a:pPr>
-            <a:r>
-              <a:rPr lang="it-IT" dirty="0" smtClean="0"/>
-              <a:t>Editor grafico per Jenkinsfile dichiarativi</a:t>
-            </a:r>
-          </a:p>
-          <a:p>
-            <a:pPr marL="285750" indent="-285750">
-              <a:buFont typeface="Arial" panose="020B0604020202020204" pitchFamily="34" charset="0"/>
-              <a:buChar char="•"/>
-            </a:pPr>
-            <a:r>
-              <a:rPr lang="it-IT" dirty="0" smtClean="0"/>
-              <a:t>Integrazione automatica delle funzioni di plugin inseriti in jenkins</a:t>
-            </a:r>
-          </a:p>
-          <a:p>
-            <a:pPr marL="285750" indent="-285750">
-              <a:buFont typeface="Arial" panose="020B0604020202020204" pitchFamily="34" charset="0"/>
-              <a:buChar char="•"/>
-            </a:pPr>
-            <a:r>
-              <a:rPr lang="it-IT" dirty="0" smtClean="0"/>
-              <a:t>Gestione delle Pipeline per i Singoli Branch</a:t>
-            </a:r>
-          </a:p>
-          <a:p>
-            <a:pPr marL="285750" indent="-285750">
-              <a:buFont typeface="Arial" panose="020B0604020202020204" pitchFamily="34" charset="0"/>
-              <a:buChar char="•"/>
-            </a:pPr>
-            <a:r>
-              <a:rPr lang="it-IT" dirty="0" smtClean="0"/>
-              <a:t>Interfaccia di esecuzione con aggiornamento dei Log real time, divisi per Step/Stage</a:t>
-            </a:r>
-          </a:p>
-          <a:p>
-            <a:pPr marL="285750" indent="-285750">
-              <a:buFont typeface="Arial" panose="020B0604020202020204" pitchFamily="34" charset="0"/>
-              <a:buChar char="•"/>
-            </a:pPr>
-            <a:r>
-              <a:rPr lang="it-IT" dirty="0" smtClean="0"/>
-              <a:t>Gestione degli artefatti archiviati</a:t>
-            </a:r>
-          </a:p>
-          <a:p>
-            <a:pPr marL="285750" indent="-285750">
-              <a:buFont typeface="Arial" panose="020B0604020202020204" pitchFamily="34" charset="0"/>
-              <a:buChar char="•"/>
-            </a:pPr>
-            <a:endParaRPr lang="it-IT" dirty="0"/>
-          </a:p>
-        </p:txBody>
-      </p:sp>
-      <p:sp>
-        <p:nvSpPr>
-          <p:cNvPr id="5" name="Subtitle 4"/>
-          <p:cNvSpPr>
-            <a:spLocks noGrp="1"/>
-          </p:cNvSpPr>
-          <p:nvPr>
-            <p:ph type="subTitle" idx="1"/>
-          </p:nvPr>
-        </p:nvSpPr>
-        <p:spPr/>
-        <p:txBody>
-          <a:bodyPr/>
-          <a:lstStyle/>
-          <a:p>
-            <a:r>
-              <a:rPr lang="it-IT" dirty="0" smtClean="0"/>
-              <a:t>Declarative Multibranch pipeline editor</a:t>
+              <a:t>Gestire il release</a:t>
             </a:r>
             <a:endParaRPr lang="it-IT" dirty="0"/>
           </a:p>
@@ -8020,13 +7806,21 @@
     </p:spTree>
     <p:extLst>
       <p:ext uri="{BB962C8B-B14F-4D97-AF65-F5344CB8AC3E}">
-        <p14:creationId xmlns:p14="http://schemas.microsoft.com/office/powerpoint/2010/main" val="2035950334"/>
+        <p14:creationId xmlns:p14="http://schemas.microsoft.com/office/powerpoint/2010/main" val="302263119"/>
       </p:ext>
     </p:extLst>
   </p:cSld>
   <p:clrMapOvr>
     <a:masterClrMapping/>
   </p:clrMapOvr>
+  <mc:AlternateContent xmlns:mc="http://schemas.openxmlformats.org/markup-compatibility/2006" xmlns:p14="http://schemas.microsoft.com/office/powerpoint/2010/main">
+    <mc:Choice Requires="p14">
+      <p:transition spd="slow" p14:dur="2000"/>
+    </mc:Choice>
+    <mc:Fallback xmlns="">
+      <p:transition spd="slow"/>
+    </mc:Fallback>
+  </mc:AlternateContent>
   <p:timing>
     <p:tnLst>
       <p:par>
@@ -8056,116 +7850,36 @@
       </p:grpSpPr>
       <p:sp>
         <p:nvSpPr>
-          <p:cNvPr id="3" name="Title 2"/>
+          <p:cNvPr id="6" name="Title 5"/>
           <p:cNvSpPr>
             <a:spLocks noGrp="1"/>
           </p:cNvSpPr>
           <p:nvPr>
-            <p:ph type="title"/>
+            <p:ph type="ctrTitle"/>
           </p:nvPr>
         </p:nvSpPr>
-        <p:spPr/>
+        <p:spPr>
+          <a:xfrm>
+            <a:off x="618371" y="1772968"/>
+            <a:ext cx="8012512" cy="1631422"/>
+          </a:xfrm>
+        </p:spPr>
         <p:txBody>
           <a:bodyPr/>
           <a:lstStyle/>
           <a:p>
             <a:r>
               <a:rPr lang="it-IT" dirty="0" smtClean="0"/>
-              <a:t>Blue ocean</a:t>
+              <a:t>CONTINUOUS DEPLOYMENT</a:t>
             </a:r>
             <a:endParaRPr lang="it-IT" dirty="0"/>
           </a:p>
         </p:txBody>
       </p:sp>
-      <p:sp>
-        <p:nvSpPr>
-          <p:cNvPr id="5" name="Subtitle 4"/>
-          <p:cNvSpPr>
-            <a:spLocks noGrp="1"/>
-          </p:cNvSpPr>
-          <p:nvPr>
-            <p:ph type="subTitle" idx="12"/>
-          </p:nvPr>
-        </p:nvSpPr>
-        <p:spPr/>
-        <p:txBody>
-          <a:bodyPr/>
-          <a:lstStyle/>
-          <a:p>
-            <a:r>
-              <a:rPr lang="it-IT" dirty="0" smtClean="0"/>
-              <a:t>Declarative </a:t>
-            </a:r>
-            <a:r>
-              <a:rPr lang="it-IT" dirty="0"/>
-              <a:t>Multibranch</a:t>
-            </a:r>
-            <a:r>
-              <a:rPr lang="it-IT" dirty="0" smtClean="0"/>
-              <a:t> pipeline editor</a:t>
-            </a:r>
-            <a:endParaRPr lang="it-IT" dirty="0"/>
-          </a:p>
-        </p:txBody>
-      </p:sp>
-      <p:pic>
-        <p:nvPicPr>
-          <p:cNvPr id="30" name="Picture Placeholder 29"/>
-          <p:cNvPicPr>
-            <a:picLocks noGrp="1" noChangeAspect="1"/>
-          </p:cNvPicPr>
-          <p:nvPr>
-            <p:ph type="pic" sz="quarter" idx="11"/>
-          </p:nvPr>
-        </p:nvPicPr>
-        <p:blipFill>
-          <a:blip r:embed="rId2">
-            <a:extLst>
-              <a:ext uri="{28A0092B-C50C-407E-A947-70E740481C1C}">
-                <a14:useLocalDpi xmlns:a14="http://schemas.microsoft.com/office/drawing/2010/main" val="0"/>
-              </a:ext>
-            </a:extLst>
-          </a:blip>
-          <a:srcRect t="872" b="872"/>
-          <a:stretch>
-            <a:fillRect/>
-          </a:stretch>
-        </p:blipFill>
-        <p:spPr/>
-      </p:pic>
-      <p:pic>
-        <p:nvPicPr>
-          <p:cNvPr id="32" name="Content Placeholder 31"/>
-          <p:cNvPicPr>
-            <a:picLocks noGrp="1" noChangeAspect="1"/>
-          </p:cNvPicPr>
-          <p:nvPr>
-            <p:ph sz="half" idx="1"/>
-          </p:nvPr>
-        </p:nvPicPr>
-        <p:blipFill>
-          <a:blip r:embed="rId3">
-            <a:extLst>
-              <a:ext uri="{28A0092B-C50C-407E-A947-70E740481C1C}">
-                <a14:useLocalDpi xmlns:a14="http://schemas.microsoft.com/office/drawing/2010/main" val="0"/>
-              </a:ext>
-            </a:extLst>
-          </a:blip>
-          <a:stretch>
-            <a:fillRect/>
-          </a:stretch>
-        </p:blipFill>
-        <p:spPr>
-          <a:xfrm>
-            <a:off x="147718" y="1161668"/>
-            <a:ext cx="3674343" cy="3746999"/>
-          </a:xfrm>
-        </p:spPr>
-      </p:pic>
     </p:spTree>
     <p:extLst>
       <p:ext uri="{BB962C8B-B14F-4D97-AF65-F5344CB8AC3E}">
-        <p14:creationId xmlns:p14="http://schemas.microsoft.com/office/powerpoint/2010/main" val="3705032429"/>
+        <p14:creationId xmlns:p14="http://schemas.microsoft.com/office/powerpoint/2010/main" val="3202703084"/>
       </p:ext>
     </p:extLst>
   </p:cSld>
@@ -8201,229 +7915,85 @@
       </p:grpSpPr>
       <p:sp>
         <p:nvSpPr>
-          <p:cNvPr id="2" name="Title 1"/>
+          <p:cNvPr id="9" name="Titolo 3"/>
           <p:cNvSpPr>
             <a:spLocks noGrp="1"/>
           </p:cNvSpPr>
           <p:nvPr>
-            <p:ph type="title"/>
+            <p:ph type="ctrTitle"/>
           </p:nvPr>
         </p:nvSpPr>
-        <p:spPr/>
+        <p:spPr>
+          <a:xfrm>
+            <a:off x="886144" y="1915236"/>
+            <a:ext cx="7389505" cy="1267896"/>
+          </a:xfrm>
+        </p:spPr>
         <p:txBody>
           <a:bodyPr/>
           <a:lstStyle/>
           <a:p>
             <a:r>
-              <a:rPr lang="it-IT" dirty="0" smtClean="0"/>
-              <a:t>Continuous integration</a:t>
-            </a:r>
-            <a:endParaRPr lang="it-IT" dirty="0"/>
-          </a:p>
-        </p:txBody>
-      </p:sp>
-      <p:sp>
-        <p:nvSpPr>
-          <p:cNvPr id="3" name="Text Placeholder 2"/>
-          <p:cNvSpPr>
-            <a:spLocks noGrp="1"/>
-          </p:cNvSpPr>
-          <p:nvPr>
-            <p:ph type="body" sz="quarter" idx="10"/>
-          </p:nvPr>
-        </p:nvSpPr>
-        <p:spPr/>
-        <p:txBody>
-          <a:bodyPr/>
-          <a:lstStyle/>
-          <a:p>
-            <a:pPr marL="285750" indent="-285750">
-              <a:buFont typeface="Arial" panose="020B0604020202020204" pitchFamily="34" charset="0"/>
-              <a:buChar char="•"/>
-            </a:pPr>
-            <a:r>
-              <a:rPr lang="it-IT" dirty="0" smtClean="0"/>
-              <a:t>Test automatici, in ambiente standard, eseguiti brevemente (&lt; 10 min)</a:t>
-            </a:r>
-          </a:p>
-          <a:p>
-            <a:pPr marL="285750" indent="-285750">
-              <a:buFont typeface="Arial" panose="020B0604020202020204" pitchFamily="34" charset="0"/>
-              <a:buChar char="•"/>
-            </a:pPr>
-            <a:r>
-              <a:rPr lang="it-IT" dirty="0" smtClean="0"/>
-              <a:t>Diminuzione del costo di Test</a:t>
-            </a:r>
-          </a:p>
-          <a:p>
-            <a:pPr marL="285750" indent="-285750">
-              <a:buFont typeface="Arial" panose="020B0604020202020204" pitchFamily="34" charset="0"/>
-              <a:buChar char="•"/>
-            </a:pPr>
-            <a:r>
-              <a:rPr lang="it-IT" cap="all" dirty="0">
+              <a:rPr lang="it-IT" sz="2800" dirty="0" smtClean="0"/>
+              <a:t>«releasing software is too often an art; it should be an </a:t>
+            </a:r>
+            <a:r>
+              <a:rPr lang="it-IT" sz="2800" b="1" dirty="0">
                 <a:solidFill>
                   <a:schemeClr val="tx2"/>
                 </a:solidFill>
                 <a:latin typeface="Arial"/>
                 <a:cs typeface="Arial"/>
               </a:rPr>
-              <a:t>Build one-time </a:t>
-            </a:r>
-            <a:r>
-              <a:rPr lang="it-IT" dirty="0" smtClean="0"/>
-              <a:t>standard</a:t>
-            </a:r>
-          </a:p>
-          <a:p>
-            <a:pPr marL="285750" indent="-285750">
-              <a:buFont typeface="Arial" panose="020B0604020202020204" pitchFamily="34" charset="0"/>
-              <a:buChar char="•"/>
-            </a:pPr>
-            <a:r>
-              <a:rPr lang="it-IT" dirty="0" smtClean="0"/>
-              <a:t>Meno bug/errori integrati nel Master (e portati in produzione)</a:t>
-            </a:r>
-          </a:p>
-          <a:p>
-            <a:pPr marL="285750" indent="-285750">
-              <a:buFont typeface="Arial" panose="020B0604020202020204" pitchFamily="34" charset="0"/>
-              <a:buChar char="•"/>
-            </a:pPr>
-            <a:r>
-              <a:rPr lang="it-IT" dirty="0" smtClean="0"/>
-              <a:t>Completo processo di sviluppo per Feature</a:t>
-            </a:r>
-          </a:p>
-          <a:p>
-            <a:pPr marL="285750" indent="-285750">
-              <a:buFont typeface="Arial" panose="020B0604020202020204" pitchFamily="34" charset="0"/>
-              <a:buChar char="•"/>
-            </a:pPr>
-            <a:r>
-              <a:rPr lang="it-IT" cap="all" dirty="0">
-                <a:solidFill>
-                  <a:schemeClr val="tx2"/>
-                </a:solidFill>
-                <a:latin typeface="Arial"/>
-                <a:cs typeface="Arial"/>
-              </a:rPr>
-              <a:t>Sistema</a:t>
-            </a:r>
-            <a:r>
-              <a:rPr lang="it-IT" dirty="0" smtClean="0"/>
-              <a:t> finale più stabile, </a:t>
-            </a:r>
-            <a:r>
-              <a:rPr lang="it-IT" cap="all" dirty="0">
-                <a:solidFill>
-                  <a:schemeClr val="tx2"/>
-                </a:solidFill>
-                <a:latin typeface="Arial"/>
-                <a:cs typeface="Arial"/>
-              </a:rPr>
-              <a:t>modulare</a:t>
-            </a:r>
-            <a:r>
-              <a:rPr lang="it-IT" dirty="0" smtClean="0"/>
-              <a:t> e mantenibile</a:t>
-            </a:r>
-          </a:p>
-          <a:p>
-            <a:pPr marL="285750" indent="-285750">
-              <a:buFont typeface="Arial" panose="020B0604020202020204" pitchFamily="34" charset="0"/>
-              <a:buChar char="•"/>
-            </a:pPr>
-            <a:r>
-              <a:rPr lang="it-IT" cap="all" dirty="0">
-                <a:solidFill>
-                  <a:schemeClr val="tx2"/>
-                </a:solidFill>
-                <a:latin typeface="Arial"/>
-                <a:cs typeface="Arial"/>
-              </a:rPr>
-              <a:t>Feedback visivo </a:t>
-            </a:r>
-            <a:r>
-              <a:rPr lang="it-IT" dirty="0" smtClean="0"/>
-              <a:t>sullo stato della build (Trasparenza nel team)</a:t>
-            </a:r>
-          </a:p>
-          <a:p>
-            <a:pPr marL="285750" indent="-285750">
-              <a:buFont typeface="Arial" panose="020B0604020202020204" pitchFamily="34" charset="0"/>
-              <a:buChar char="•"/>
-            </a:pPr>
-            <a:r>
-              <a:rPr lang="it-IT" cap="all" dirty="0">
-                <a:solidFill>
-                  <a:schemeClr val="tx2"/>
-                </a:solidFill>
-                <a:latin typeface="Arial"/>
-                <a:cs typeface="Arial"/>
-              </a:rPr>
-              <a:t>Maggior responsabilità</a:t>
-            </a:r>
-            <a:r>
-              <a:rPr lang="it-IT" dirty="0" smtClean="0"/>
-              <a:t> del singolo e diminuzione del debito tecnico</a:t>
-            </a:r>
-          </a:p>
-          <a:p>
-            <a:pPr marL="285750" indent="-285750">
-              <a:buFont typeface="Arial" panose="020B0604020202020204" pitchFamily="34" charset="0"/>
-              <a:buChar char="•"/>
-            </a:pPr>
-            <a:r>
-              <a:rPr lang="it-IT" dirty="0" smtClean="0"/>
-              <a:t>Condizioni di lavoro migliori</a:t>
-            </a:r>
-            <a:endParaRPr lang="it-IT" dirty="0"/>
-          </a:p>
-        </p:txBody>
-      </p:sp>
-      <p:sp>
-        <p:nvSpPr>
-          <p:cNvPr id="4" name="Subtitle 3"/>
-          <p:cNvSpPr>
-            <a:spLocks noGrp="1"/>
-          </p:cNvSpPr>
-          <p:nvPr>
-            <p:ph type="subTitle" idx="1"/>
-          </p:nvPr>
-        </p:nvSpPr>
-        <p:spPr/>
-        <p:txBody>
-          <a:bodyPr/>
+              <a:t>engineering discipline</a:t>
+            </a:r>
+            <a:r>
+              <a:rPr lang="it-IT" sz="2800" dirty="0" smtClean="0"/>
+              <a:t>»</a:t>
+            </a:r>
+            <a:endParaRPr lang="it-IT" sz="2800" dirty="0"/>
+          </a:p>
+        </p:txBody>
+      </p:sp>
+      <p:sp>
+        <p:nvSpPr>
+          <p:cNvPr id="2" name="Rectangle 1"/>
+          <p:cNvSpPr/>
+          <p:nvPr/>
+        </p:nvSpPr>
+        <p:spPr>
+          <a:xfrm>
+            <a:off x="4894342" y="3152412"/>
+            <a:ext cx="3433933" cy="646331"/>
+          </a:xfrm>
+          <a:prstGeom prst="rect">
+            <a:avLst/>
+          </a:prstGeom>
+        </p:spPr>
+        <p:txBody>
+          <a:bodyPr wrap="square">
+            <a:spAutoFit/>
+          </a:bodyPr>
           <a:lstStyle/>
           <a:p>
             <a:r>
-              <a:rPr lang="it-IT" dirty="0" smtClean="0"/>
-              <a:t>vantaggi</a:t>
-            </a:r>
-            <a:endParaRPr lang="it-IT" dirty="0"/>
+              <a:rPr lang="it-IT" sz="1200" i="1" dirty="0" smtClean="0"/>
+              <a:t>David Farley – Continuous Delivery: Reliable Software Releases through Build, Test and Deployment Automation</a:t>
+            </a:r>
+            <a:endParaRPr lang="it-IT" sz="1200" i="1" dirty="0"/>
           </a:p>
         </p:txBody>
       </p:sp>
     </p:spTree>
     <p:extLst>
       <p:ext uri="{BB962C8B-B14F-4D97-AF65-F5344CB8AC3E}">
-        <p14:creationId xmlns:p14="http://schemas.microsoft.com/office/powerpoint/2010/main" val="3814299900"/>
+        <p14:creationId xmlns:p14="http://schemas.microsoft.com/office/powerpoint/2010/main" val="942816290"/>
       </p:ext>
     </p:extLst>
   </p:cSld>
   <p:clrMapOvr>
     <a:masterClrMapping/>
   </p:clrMapOvr>
-  <mc:AlternateContent xmlns:mc="http://schemas.openxmlformats.org/markup-compatibility/2006" xmlns:p14="http://schemas.microsoft.com/office/powerpoint/2010/main">
-    <mc:Choice Requires="p14">
-      <p:transition spd="slow" p14:dur="2000"/>
-    </mc:Choice>
-    <mc:Fallback xmlns="">
-      <p:transition spd="slow"/>
-    </mc:Fallback>
-  </mc:AlternateContent>
   <p:timing>
     <p:tnLst>
       <p:par>
@@ -8453,27 +8023,158 @@
       </p:grpSpPr>
       <p:sp>
         <p:nvSpPr>
-          <p:cNvPr id="6" name="Title 5"/>
+          <p:cNvPr id="2" name="Title 1"/>
           <p:cNvSpPr>
             <a:spLocks noGrp="1"/>
           </p:cNvSpPr>
           <p:nvPr>
-            <p:ph type="ctrTitle"/>
+            <p:ph type="title"/>
+          </p:nvPr>
+        </p:nvSpPr>
+        <p:spPr/>
+        <p:txBody>
+          <a:bodyPr/>
+          <a:lstStyle/>
+          <a:p>
+            <a:r>
+              <a:rPr lang="it-IT" dirty="0" smtClean="0"/>
+              <a:t>Continuous deployment</a:t>
+            </a:r>
+            <a:endParaRPr lang="it-IT" dirty="0"/>
+          </a:p>
+        </p:txBody>
+      </p:sp>
+      <p:sp>
+        <p:nvSpPr>
+          <p:cNvPr id="3" name="Text Placeholder 2"/>
+          <p:cNvSpPr>
+            <a:spLocks noGrp="1"/>
+          </p:cNvSpPr>
+          <p:nvPr>
+            <p:ph type="body" sz="quarter" idx="10"/>
           </p:nvPr>
         </p:nvSpPr>
         <p:spPr>
           <a:xfrm>
-            <a:off x="618371" y="1772968"/>
-            <a:ext cx="8012512" cy="1631422"/>
+            <a:off x="573852" y="1401951"/>
+            <a:ext cx="7968163" cy="3571332"/>
           </a:xfrm>
         </p:spPr>
         <p:txBody>
           <a:bodyPr/>
           <a:lstStyle/>
           <a:p>
-            <a:r>
-              <a:rPr lang="it-IT" dirty="0" smtClean="0"/>
-              <a:t>CONTINUOUS DEPLOYMENT</a:t>
+            <a:pPr algn="ctr"/>
+            <a:r>
+              <a:rPr lang="it-IT" dirty="0" smtClean="0"/>
+              <a:t>Automazione e Industrializzazione di ogni fase del ciclo di vita del prodotto.</a:t>
+            </a:r>
+          </a:p>
+          <a:p>
+            <a:endParaRPr lang="it-IT" dirty="0" smtClean="0"/>
+          </a:p>
+          <a:p>
+            <a:r>
+              <a:rPr lang="it-IT" dirty="0" smtClean="0"/>
+              <a:t>Per ogni nuova Feature (corretta e funzionante) :</a:t>
+            </a:r>
+          </a:p>
+          <a:p>
+            <a:pPr marL="285750" indent="-285750">
+              <a:buFont typeface="Arial" panose="020B0604020202020204" pitchFamily="34" charset="0"/>
+              <a:buChar char="•"/>
+            </a:pPr>
+            <a:r>
+              <a:rPr lang="it-IT" dirty="0" smtClean="0"/>
+              <a:t>Test accurati</a:t>
+            </a:r>
+          </a:p>
+          <a:p>
+            <a:pPr marL="285750" indent="-285750">
+              <a:buFont typeface="Arial" panose="020B0604020202020204" pitchFamily="34" charset="0"/>
+              <a:buChar char="•"/>
+            </a:pPr>
+            <a:r>
+              <a:rPr lang="it-IT" dirty="0" smtClean="0"/>
+              <a:t>Integrazione nel Master</a:t>
+            </a:r>
+          </a:p>
+          <a:p>
+            <a:pPr marL="285750" indent="-285750">
+              <a:buFont typeface="Arial" panose="020B0604020202020204" pitchFamily="34" charset="0"/>
+              <a:buChar char="•"/>
+            </a:pPr>
+            <a:r>
+              <a:rPr lang="it-IT" dirty="0" smtClean="0"/>
+              <a:t>Test del prodotto completo</a:t>
+            </a:r>
+          </a:p>
+          <a:p>
+            <a:pPr marL="285750" indent="-285750">
+              <a:buFont typeface="Arial" panose="020B0604020202020204" pitchFamily="34" charset="0"/>
+              <a:buChar char="•"/>
+            </a:pPr>
+            <a:r>
+              <a:rPr lang="it-IT" dirty="0" smtClean="0"/>
+              <a:t>Build</a:t>
+            </a:r>
+          </a:p>
+          <a:p>
+            <a:pPr marL="285750" indent="-285750">
+              <a:buFont typeface="Arial" panose="020B0604020202020204" pitchFamily="34" charset="0"/>
+              <a:buChar char="•"/>
+            </a:pPr>
+            <a:r>
+              <a:rPr lang="it-IT" dirty="0" smtClean="0"/>
+              <a:t>Deploy in produzione</a:t>
+            </a:r>
+          </a:p>
+          <a:p>
+            <a:pPr marL="285750" indent="-285750">
+              <a:buFont typeface="Arial" panose="020B0604020202020204" pitchFamily="34" charset="0"/>
+              <a:buChar char="•"/>
+            </a:pPr>
+            <a:endParaRPr lang="it-IT" dirty="0"/>
+          </a:p>
+          <a:p>
+            <a:pPr algn="ctr"/>
+            <a:r>
+              <a:rPr lang="it-IT" b="1" cap="all" dirty="0">
+                <a:solidFill>
+                  <a:schemeClr val="tx2"/>
+                </a:solidFill>
+                <a:cs typeface="Arial"/>
+              </a:rPr>
+              <a:t>Nessun intervento manuale !!</a:t>
+            </a:r>
+          </a:p>
+          <a:p>
+            <a:pPr marL="285750" indent="-285750">
+              <a:buFont typeface="Arial" panose="020B0604020202020204" pitchFamily="34" charset="0"/>
+              <a:buChar char="•"/>
+            </a:pPr>
+            <a:endParaRPr lang="it-IT" dirty="0"/>
+          </a:p>
+        </p:txBody>
+      </p:sp>
+      <p:sp>
+        <p:nvSpPr>
+          <p:cNvPr id="4" name="Subtitle 3"/>
+          <p:cNvSpPr>
+            <a:spLocks noGrp="1"/>
+          </p:cNvSpPr>
+          <p:nvPr>
+            <p:ph type="subTitle" idx="1"/>
+          </p:nvPr>
+        </p:nvSpPr>
+        <p:spPr/>
+        <p:txBody>
+          <a:bodyPr/>
+          <a:lstStyle/>
+          <a:p>
+            <a:r>
+              <a:rPr lang="it-IT" dirty="0" smtClean="0"/>
+              <a:t>In teoria...</a:t>
             </a:r>
             <a:endParaRPr lang="it-IT" dirty="0"/>
           </a:p>
@@ -8482,13 +8183,21 @@
     </p:spTree>
     <p:extLst>
       <p:ext uri="{BB962C8B-B14F-4D97-AF65-F5344CB8AC3E}">
-        <p14:creationId xmlns:p14="http://schemas.microsoft.com/office/powerpoint/2010/main" val="3202703084"/>
+        <p14:creationId xmlns:p14="http://schemas.microsoft.com/office/powerpoint/2010/main" val="496996436"/>
       </p:ext>
     </p:extLst>
   </p:cSld>
   <p:clrMapOvr>
     <a:masterClrMapping/>
   </p:clrMapOvr>
+  <mc:AlternateContent xmlns:mc="http://schemas.openxmlformats.org/markup-compatibility/2006" xmlns:p14="http://schemas.microsoft.com/office/powerpoint/2010/main">
+    <mc:Choice Requires="p14">
+      <p:transition spd="slow" p14:dur="2000"/>
+    </mc:Choice>
+    <mc:Fallback xmlns="">
+      <p:transition spd="slow"/>
+    </mc:Fallback>
+  </mc:AlternateContent>
   <p:timing>
     <p:tnLst>
       <p:par>
@@ -8644,116 +8353,7 @@
       </p:grpSpPr>
       <p:sp>
         <p:nvSpPr>
-          <p:cNvPr id="8" name="Content Placeholder 7"/>
-          <p:cNvSpPr>
-            <a:spLocks noGrp="1"/>
-          </p:cNvSpPr>
-          <p:nvPr>
-            <p:ph sz="half" idx="1"/>
-          </p:nvPr>
-        </p:nvSpPr>
-        <p:spPr>
-          <a:xfrm>
-            <a:off x="573852" y="1437651"/>
-            <a:ext cx="4096824" cy="3075143"/>
-          </a:xfrm>
-        </p:spPr>
-        <p:txBody>
-          <a:bodyPr/>
-          <a:lstStyle/>
-          <a:p>
-            <a:r>
-              <a:rPr lang="it-IT" sz="1800" dirty="0" smtClean="0"/>
-              <a:t>Test nella Pipeline di CI hanno un ruolo Fondamentale.</a:t>
-            </a:r>
-          </a:p>
-          <a:p>
-            <a:r>
-              <a:rPr lang="it-IT" sz="1800" dirty="0" smtClean="0"/>
-              <a:t>Sono l’</a:t>
-            </a:r>
-            <a:r>
-              <a:rPr lang="it-IT" sz="1800" b="1" cap="all" dirty="0" smtClean="0">
-                <a:solidFill>
-                  <a:schemeClr val="tx2"/>
-                </a:solidFill>
-                <a:latin typeface="Arial"/>
-                <a:cs typeface="Arial"/>
-              </a:rPr>
-              <a:t>unica </a:t>
-            </a:r>
-            <a:r>
-              <a:rPr lang="it-IT" sz="1800" b="1" cap="all" dirty="0">
-                <a:solidFill>
-                  <a:schemeClr val="tx2"/>
-                </a:solidFill>
-                <a:latin typeface="Arial"/>
-                <a:cs typeface="Arial"/>
-              </a:rPr>
-              <a:t>Fonte di Difesa </a:t>
-            </a:r>
-            <a:r>
-              <a:rPr lang="it-IT" sz="1800" dirty="0" smtClean="0"/>
-              <a:t>dall’integrazione di codice non funzionante o buggato.</a:t>
-            </a:r>
-          </a:p>
-          <a:p>
-            <a:endParaRPr lang="it-IT" sz="1800" dirty="0"/>
-          </a:p>
-          <a:p>
-            <a:r>
-              <a:rPr lang="it-IT" sz="1800" dirty="0" smtClean="0"/>
-              <a:t>Il Continuous Testing arricchisce l’Automated Testing con Tools e Cultura per garantire la </a:t>
-            </a:r>
-            <a:r>
-              <a:rPr lang="it-IT" sz="1800" b="1" cap="all" dirty="0">
-                <a:solidFill>
-                  <a:schemeClr val="tx2"/>
-                </a:solidFill>
-                <a:latin typeface="Arial"/>
-                <a:cs typeface="Arial"/>
-              </a:rPr>
-              <a:t>qualità</a:t>
-            </a:r>
-            <a:r>
-              <a:rPr lang="it-IT" sz="1800" dirty="0" smtClean="0"/>
-              <a:t> del software.</a:t>
-            </a:r>
-          </a:p>
-        </p:txBody>
-      </p:sp>
-      <p:pic>
-        <p:nvPicPr>
-          <p:cNvPr id="12" name="Content Placeholder 11"/>
-          <p:cNvPicPr>
-            <a:picLocks noGrp="1" noChangeAspect="1"/>
-          </p:cNvPicPr>
-          <p:nvPr>
-            <p:ph sz="half" idx="2"/>
-          </p:nvPr>
-        </p:nvPicPr>
-        <p:blipFill>
-          <a:blip r:embed="rId2">
-            <a:extLst>
-              <a:ext uri="{28A0092B-C50C-407E-A947-70E740481C1C}">
-                <a14:useLocalDpi xmlns:a14="http://schemas.microsoft.com/office/drawing/2010/main" val="0"/>
-              </a:ext>
-            </a:extLst>
-          </a:blip>
-          <a:stretch>
-            <a:fillRect/>
-          </a:stretch>
-        </p:blipFill>
-        <p:spPr>
-          <a:xfrm>
-            <a:off x="4854872" y="1161668"/>
-            <a:ext cx="3821062" cy="3821062"/>
-          </a:xfrm>
-        </p:spPr>
-      </p:pic>
-      <p:sp>
-        <p:nvSpPr>
-          <p:cNvPr id="7" name="Title 6"/>
+          <p:cNvPr id="2" name="Title 1"/>
           <p:cNvSpPr>
             <a:spLocks noGrp="1"/>
           </p:cNvSpPr>
@@ -8768,7 +8368,7 @@
           <a:p>
             <a:r>
               <a:rPr lang="it-IT" dirty="0" smtClean="0"/>
-              <a:t>Continuous testing</a:t>
+              <a:t>Continous deployment</a:t>
             </a:r>
             <a:endParaRPr lang="it-IT" dirty="0"/>
           </a:p>
@@ -8776,12 +8376,12 @@
       </p:sp>
       <p:sp>
         <p:nvSpPr>
-          <p:cNvPr id="10" name="Subtitle 9"/>
+          <p:cNvPr id="4" name="Subtitle 3"/>
           <p:cNvSpPr>
             <a:spLocks noGrp="1"/>
           </p:cNvSpPr>
           <p:nvPr>
-            <p:ph type="subTitle" idx="10"/>
+            <p:ph type="subTitle" idx="1"/>
           </p:nvPr>
         </p:nvSpPr>
         <p:spPr/>
@@ -8791,7 +8391,120 @@
           <a:p>
             <a:r>
               <a:rPr lang="it-IT" dirty="0" smtClean="0"/>
-              <a:t>Non solo test</a:t>
+              <a:t>... In pratica</a:t>
+            </a:r>
+            <a:endParaRPr lang="it-IT" dirty="0"/>
+          </a:p>
+        </p:txBody>
+      </p:sp>
+      <p:sp>
+        <p:nvSpPr>
+          <p:cNvPr id="3" name="Text Placeholder 2"/>
+          <p:cNvSpPr>
+            <a:spLocks noGrp="1"/>
+          </p:cNvSpPr>
+          <p:nvPr>
+            <p:ph idx="10"/>
+          </p:nvPr>
+        </p:nvSpPr>
+        <p:spPr>
+          <a:xfrm>
+            <a:off x="603248" y="1594892"/>
+            <a:ext cx="7937501" cy="2753442"/>
+          </a:xfrm>
+        </p:spPr>
+        <p:txBody>
+          <a:bodyPr/>
+          <a:lstStyle/>
+          <a:p>
+            <a:pPr marL="0" indent="0">
+              <a:buNone/>
+            </a:pPr>
+            <a:r>
+              <a:rPr lang="it-IT" dirty="0" smtClean="0"/>
+              <a:t>Traguardo molto complesso (non sempre necessario) da raggiungere.</a:t>
+            </a:r>
+          </a:p>
+          <a:p>
+            <a:pPr marL="0" indent="0">
+              <a:buNone/>
+            </a:pPr>
+            <a:r>
+              <a:rPr lang="it-IT" dirty="0" smtClean="0"/>
+              <a:t>Richiede:</a:t>
+            </a:r>
+          </a:p>
+          <a:p>
+            <a:pPr marL="285750" indent="-285750">
+              <a:buFont typeface="Arial" panose="020B0604020202020204" pitchFamily="34" charset="0"/>
+              <a:buChar char="•"/>
+            </a:pPr>
+            <a:r>
+              <a:rPr lang="it-IT" dirty="0" smtClean="0"/>
+              <a:t>Massima coesione nel team, Massima fiducia sul lavoro altrui</a:t>
+            </a:r>
+          </a:p>
+          <a:p>
+            <a:pPr marL="285750" indent="-285750">
+              <a:buFont typeface="Arial" panose="020B0604020202020204" pitchFamily="34" charset="0"/>
+              <a:buChar char="•"/>
+            </a:pPr>
+            <a:r>
+              <a:rPr lang="it-IT" dirty="0" smtClean="0"/>
+              <a:t>Comprensione Totale delle pratiche precedenti</a:t>
+            </a:r>
+          </a:p>
+          <a:p>
+            <a:pPr marL="285750" indent="-285750">
+              <a:buFont typeface="Arial" panose="020B0604020202020204" pitchFamily="34" charset="0"/>
+              <a:buChar char="•"/>
+            </a:pPr>
+            <a:r>
+              <a:rPr lang="it-IT" dirty="0" smtClean="0"/>
+              <a:t>Massimo affidamento sulla Pipeline di CD</a:t>
+            </a:r>
+          </a:p>
+          <a:p>
+            <a:pPr marL="285750" indent="-285750">
+              <a:buFont typeface="Arial" panose="020B0604020202020204" pitchFamily="34" charset="0"/>
+              <a:buChar char="•"/>
+            </a:pPr>
+            <a:r>
+              <a:rPr lang="it-IT" b="1" cap="all" dirty="0">
+                <a:solidFill>
+                  <a:schemeClr val="tx2"/>
+                </a:solidFill>
+                <a:cs typeface="Arial"/>
+              </a:rPr>
+              <a:t>Test sono l’unica garanzia di </a:t>
+            </a:r>
+            <a:r>
+              <a:rPr lang="it-IT" b="1" cap="all" dirty="0" smtClean="0">
+                <a:solidFill>
+                  <a:schemeClr val="tx2"/>
+                </a:solidFill>
+                <a:cs typeface="Arial"/>
+              </a:rPr>
+              <a:t>qualità </a:t>
+            </a:r>
+            <a:r>
+              <a:rPr lang="it-IT" b="1" cap="all" dirty="0">
+                <a:solidFill>
+                  <a:schemeClr val="tx2"/>
+                </a:solidFill>
+                <a:cs typeface="Arial"/>
+              </a:rPr>
+              <a:t>del sistema</a:t>
+            </a:r>
+          </a:p>
+          <a:p>
+            <a:pPr marL="285750" indent="-285750">
+              <a:buFont typeface="Arial" panose="020B0604020202020204" pitchFamily="34" charset="0"/>
+              <a:buChar char="•"/>
+            </a:pPr>
+            <a:r>
+              <a:rPr lang="it-IT" dirty="0" smtClean="0"/>
+              <a:t>Sistema di Continuous Monitoring in grado di verificare che tutto funzioni anche in post – produzione.</a:t>
             </a:r>
             <a:endParaRPr lang="it-IT" dirty="0"/>
           </a:p>
@@ -8800,13 +8513,28 @@
     </p:spTree>
     <p:extLst>
       <p:ext uri="{BB962C8B-B14F-4D97-AF65-F5344CB8AC3E}">
-        <p14:creationId xmlns:p14="http://schemas.microsoft.com/office/powerpoint/2010/main" val="1464355070"/>
+        <p14:creationId xmlns:p14="http://schemas.microsoft.com/office/powerpoint/2010/main" val="838324453"/>
       </p:ext>
     </p:extLst>
   </p:cSld>
   <p:clrMapOvr>
     <a:masterClrMapping/>
   </p:clrMapOvr>
+  <mc:AlternateContent xmlns:mc="http://schemas.openxmlformats.org/markup-compatibility/2006" xmlns:p14="http://schemas.microsoft.com/office/powerpoint/2010/main">
+    <mc:Choice Requires="p14">
+      <p:transition spd="slow" p14:dur="2000"/>
+    </mc:Choice>
+    <mc:Fallback xmlns="">
+      <p:transition spd="slow"/>
+    </mc:Fallback>
+  </mc:AlternateContent>
+  <p:timing>
+    <p:tnLst>
+      <p:par>
+        <p:cTn id="1" dur="indefinite" restart="never" nodeType="tmRoot"/>
+      </p:par>
+    </p:tnLst>
+  </p:timing>
 </p:sld>
 </file>
 
@@ -8844,312 +8572,12 @@
           <a:p>
             <a:r>
               <a:rPr lang="it-IT" dirty="0" smtClean="0"/>
-              <a:t>Continuous testing</a:t>
+              <a:t>Continuous delivery</a:t>
             </a:r>
             <a:endParaRPr lang="it-IT" dirty="0"/>
           </a:p>
         </p:txBody>
       </p:sp>
-      <mc:AlternateContent xmlns:mc="http://schemas.openxmlformats.org/markup-compatibility/2006" xmlns:a14="http://schemas.microsoft.com/office/drawing/2010/main">
-        <mc:Choice Requires="a14">
-          <p:sp>
-            <p:nvSpPr>
-              <p:cNvPr id="3" name="Text Placeholder 2"/>
-              <p:cNvSpPr>
-                <a:spLocks noGrp="1"/>
-              </p:cNvSpPr>
-              <p:nvPr>
-                <p:ph type="body" sz="quarter" idx="10"/>
-              </p:nvPr>
-            </p:nvSpPr>
-            <p:spPr>
-              <a:xfrm>
-                <a:off x="573852" y="1401950"/>
-                <a:ext cx="7968163" cy="3229255"/>
-              </a:xfrm>
-            </p:spPr>
-            <p:txBody>
-              <a:bodyPr/>
-              <a:lstStyle/>
-              <a:p>
-                <a:r>
-                  <a:rPr lang="it-IT" dirty="0" smtClean="0"/>
-                  <a:t>Nell’ottica del Continuous Deployment i Test assumono nuova semantica:</a:t>
-                </a:r>
-              </a:p>
-              <a:p>
-                <a:pPr marL="285750" indent="-285750">
-                  <a:buFont typeface="Arial" panose="020B0604020202020204" pitchFamily="34" charset="0"/>
-                  <a:buChar char="•"/>
-                </a:pPr>
-                <a:r>
-                  <a:rPr lang="it-IT" dirty="0" smtClean="0"/>
-                  <a:t>Sono la principale </a:t>
-                </a:r>
-                <a:r>
-                  <a:rPr lang="it-IT" cap="all" dirty="0">
-                    <a:solidFill>
-                      <a:schemeClr val="tx2"/>
-                    </a:solidFill>
-                    <a:latin typeface="Arial"/>
-                    <a:cs typeface="Arial"/>
-                  </a:rPr>
-                  <a:t>garanzia di qualità </a:t>
-                </a:r>
-                <a:r>
-                  <a:rPr lang="it-IT" dirty="0" smtClean="0"/>
-                  <a:t>del Software rilasciato</a:t>
-                </a:r>
-                <a:endParaRPr lang="it-IT" dirty="0"/>
-              </a:p>
-              <a:p>
-                <a:pPr marL="285750" indent="-285750">
-                  <a:buFont typeface="Arial" panose="020B0604020202020204" pitchFamily="34" charset="0"/>
-                  <a:buChar char="•"/>
-                </a:pPr>
-                <a:endParaRPr lang="it-IT" dirty="0" smtClean="0"/>
-              </a:p>
-              <a:p>
-                <a:pPr algn="ctr"/>
-                <a:r>
-                  <a:rPr lang="it-IT" b="1" cap="all" dirty="0">
-                    <a:solidFill>
-                      <a:schemeClr val="tx2"/>
-                    </a:solidFill>
-                    <a:latin typeface="Arial"/>
-                    <a:cs typeface="Arial"/>
-                  </a:rPr>
-                  <a:t>COVERAGE</a:t>
-                </a:r>
-                <a:r>
-                  <a:rPr lang="it-IT" dirty="0"/>
-                  <a:t> </a:t>
-                </a:r>
-                <a:r>
-                  <a:rPr lang="it-IT" dirty="0" smtClean="0"/>
-                  <a:t>= </a:t>
-                </a:r>
-                <a14:m>
-                  <m:oMath xmlns:m="http://schemas.openxmlformats.org/officeDocument/2006/math">
-                    <m:f>
-                      <m:fPr>
-                        <m:ctrlPr>
-                          <a:rPr lang="it-IT" sz="2800" i="1">
-                            <a:latin typeface="Cambria Math" panose="02040503050406030204" pitchFamily="18" charset="0"/>
-                          </a:rPr>
-                        </m:ctrlPr>
-                      </m:fPr>
-                      <m:num>
-                        <m:r>
-                          <m:rPr>
-                            <m:sty m:val="p"/>
-                          </m:rPr>
-                          <a:rPr lang="it-IT" sz="2800" i="0">
-                            <a:latin typeface="Cambria Math" panose="02040503050406030204" pitchFamily="18" charset="0"/>
-                          </a:rPr>
-                          <m:t>Righe</m:t>
-                        </m:r>
-                        <m:r>
-                          <a:rPr lang="it-IT" sz="2800" i="0">
-                            <a:latin typeface="Cambria Math" panose="02040503050406030204" pitchFamily="18" charset="0"/>
-                          </a:rPr>
-                          <m:t> </m:t>
-                        </m:r>
-                        <m:r>
-                          <m:rPr>
-                            <m:sty m:val="p"/>
-                          </m:rPr>
-                          <a:rPr lang="it-IT" sz="2800" i="0">
-                            <a:latin typeface="Cambria Math" panose="02040503050406030204" pitchFamily="18" charset="0"/>
-                          </a:rPr>
-                          <m:t>di</m:t>
-                        </m:r>
-                        <m:r>
-                          <a:rPr lang="it-IT" sz="2800" i="0">
-                            <a:latin typeface="Cambria Math" panose="02040503050406030204" pitchFamily="18" charset="0"/>
-                          </a:rPr>
-                          <m:t> </m:t>
-                        </m:r>
-                        <m:r>
-                          <m:rPr>
-                            <m:sty m:val="p"/>
-                          </m:rPr>
-                          <a:rPr lang="it-IT" sz="2800" i="0">
-                            <a:latin typeface="Cambria Math" panose="02040503050406030204" pitchFamily="18" charset="0"/>
-                          </a:rPr>
-                          <m:t>Codice</m:t>
-                        </m:r>
-                        <m:r>
-                          <a:rPr lang="it-IT" sz="2800" i="0">
-                            <a:latin typeface="Cambria Math" panose="02040503050406030204" pitchFamily="18" charset="0"/>
-                          </a:rPr>
-                          <m:t> </m:t>
-                        </m:r>
-                        <m:r>
-                          <m:rPr>
-                            <m:sty m:val="p"/>
-                          </m:rPr>
-                          <a:rPr lang="it-IT" sz="2800" i="0">
-                            <a:latin typeface="Cambria Math" panose="02040503050406030204" pitchFamily="18" charset="0"/>
-                          </a:rPr>
-                          <m:t>Testato</m:t>
-                        </m:r>
-                      </m:num>
-                      <m:den>
-                        <m:r>
-                          <m:rPr>
-                            <m:sty m:val="p"/>
-                          </m:rPr>
-                          <a:rPr lang="it-IT" sz="2800" i="0">
-                            <a:latin typeface="Cambria Math" panose="02040503050406030204" pitchFamily="18" charset="0"/>
-                          </a:rPr>
-                          <m:t>Righe</m:t>
-                        </m:r>
-                        <m:r>
-                          <a:rPr lang="it-IT" sz="2800" i="0">
-                            <a:latin typeface="Cambria Math" panose="02040503050406030204" pitchFamily="18" charset="0"/>
-                          </a:rPr>
-                          <m:t> </m:t>
-                        </m:r>
-                        <m:r>
-                          <m:rPr>
-                            <m:sty m:val="p"/>
-                          </m:rPr>
-                          <a:rPr lang="it-IT" sz="2800" i="0">
-                            <a:latin typeface="Cambria Math" panose="02040503050406030204" pitchFamily="18" charset="0"/>
-                          </a:rPr>
-                          <m:t>di</m:t>
-                        </m:r>
-                        <m:r>
-                          <a:rPr lang="it-IT" sz="2800" i="0">
-                            <a:latin typeface="Cambria Math" panose="02040503050406030204" pitchFamily="18" charset="0"/>
-                          </a:rPr>
-                          <m:t> </m:t>
-                        </m:r>
-                        <m:r>
-                          <m:rPr>
-                            <m:sty m:val="p"/>
-                          </m:rPr>
-                          <a:rPr lang="it-IT" sz="2800" i="0">
-                            <a:latin typeface="Cambria Math" panose="02040503050406030204" pitchFamily="18" charset="0"/>
-                          </a:rPr>
-                          <m:t>Codice</m:t>
-                        </m:r>
-                        <m:r>
-                          <a:rPr lang="it-IT" sz="2800" i="0">
-                            <a:latin typeface="Cambria Math" panose="02040503050406030204" pitchFamily="18" charset="0"/>
-                          </a:rPr>
-                          <m:t> </m:t>
-                        </m:r>
-                        <m:r>
-                          <m:rPr>
-                            <m:sty m:val="p"/>
-                          </m:rPr>
-                          <a:rPr lang="it-IT" sz="2800" i="0">
-                            <a:latin typeface="Cambria Math" panose="02040503050406030204" pitchFamily="18" charset="0"/>
-                          </a:rPr>
-                          <m:t>Scritto</m:t>
-                        </m:r>
-                      </m:den>
-                    </m:f>
-                  </m:oMath>
-                </a14:m>
-                <a:endParaRPr lang="it-IT" dirty="0" smtClean="0"/>
-              </a:p>
-              <a:p>
-                <a:pPr algn="ctr"/>
-                <a:endParaRPr lang="it-IT" dirty="0" smtClean="0"/>
-              </a:p>
-              <a:p>
-                <a:pPr marL="285750" indent="-285750">
-                  <a:buFont typeface="Arial" panose="020B0604020202020204" pitchFamily="34" charset="0"/>
-                  <a:buChar char="•"/>
-                </a:pPr>
-                <a:r>
-                  <a:rPr lang="it-IT" dirty="0" smtClean="0"/>
-                  <a:t>Indicatore del </a:t>
-                </a:r>
-                <a:r>
-                  <a:rPr lang="it-IT" cap="all" dirty="0">
-                    <a:solidFill>
-                      <a:schemeClr val="tx2"/>
-                    </a:solidFill>
-                    <a:latin typeface="Arial"/>
-                    <a:cs typeface="Arial"/>
-                  </a:rPr>
-                  <a:t>Rischio commerciale </a:t>
-                </a:r>
-                <a:r>
-                  <a:rPr lang="it-IT" dirty="0" smtClean="0"/>
-                  <a:t>legato al rilascio</a:t>
-                </a:r>
-              </a:p>
-              <a:p>
-                <a:pPr marL="285750" indent="-285750">
-                  <a:buFont typeface="Arial" panose="020B0604020202020204" pitchFamily="34" charset="0"/>
-                  <a:buChar char="•"/>
-                </a:pPr>
-                <a:r>
-                  <a:rPr lang="it-IT" dirty="0" smtClean="0"/>
-                  <a:t>Indicatore di </a:t>
-                </a:r>
-                <a:r>
-                  <a:rPr lang="it-IT" cap="all" dirty="0" smtClean="0">
-                    <a:solidFill>
-                      <a:schemeClr val="tx2"/>
-                    </a:solidFill>
-                    <a:latin typeface="Arial"/>
-                    <a:cs typeface="Arial"/>
-                  </a:rPr>
-                  <a:t>progressione</a:t>
-                </a:r>
-                <a:r>
-                  <a:rPr lang="it-IT" dirty="0" smtClean="0"/>
-                  <a:t> dello sviluppo</a:t>
-                </a:r>
-                <a:endParaRPr lang="it-IT" dirty="0"/>
-              </a:p>
-            </p:txBody>
-          </p:sp>
-        </mc:Choice>
-        <mc:Fallback xmlns="">
-          <p:sp>
-            <p:nvSpPr>
-              <p:cNvPr id="3" name="Text Placeholder 2"/>
-              <p:cNvSpPr>
-                <a:spLocks noGrp="1" noRot="1" noChangeAspect="1" noMove="1" noResize="1" noEditPoints="1" noAdjustHandles="1" noChangeArrowheads="1" noChangeShapeType="1" noTextEdit="1"/>
-              </p:cNvSpPr>
-              <p:nvPr>
-                <p:ph type="body" sz="quarter" idx="10"/>
-              </p:nvPr>
-            </p:nvSpPr>
-            <p:spPr>
-              <a:xfrm>
-                <a:off x="573852" y="1401950"/>
-                <a:ext cx="7968163" cy="3229255"/>
-              </a:xfrm>
-              <a:blipFill>
-                <a:blip r:embed="rId2"/>
-                <a:stretch>
-                  <a:fillRect l="-1760" t="-2453"/>
-                </a:stretch>
-              </a:blipFill>
-            </p:spPr>
-            <p:txBody>
-              <a:bodyPr/>
-              <a:lstStyle/>
-              <a:p>
-                <a:r>
-                  <a:rPr lang="it-IT">
-                    <a:noFill/>
-                  </a:rPr>
-                  <a:t> </a:t>
-                </a:r>
-              </a:p>
-            </p:txBody>
-          </p:sp>
-        </mc:Fallback>
-      </mc:AlternateContent>
       <p:sp>
         <p:nvSpPr>
           <p:cNvPr id="4" name="Subtitle 3"/>
@@ -9167,7 +8595,144 @@
           <a:p>
             <a:r>
               <a:rPr lang="it-IT" dirty="0" smtClean="0"/>
-              <a:t>Nuova semantica di test</a:t>
+              <a:t>Vantaggi di business</a:t>
+            </a:r>
+            <a:endParaRPr lang="it-IT" dirty="0"/>
+          </a:p>
+        </p:txBody>
+      </p:sp>
+      <p:sp>
+        <p:nvSpPr>
+          <p:cNvPr id="3" name="Text Placeholder 2"/>
+          <p:cNvSpPr>
+            <a:spLocks noGrp="1"/>
+          </p:cNvSpPr>
+          <p:nvPr>
+            <p:ph idx="10"/>
+          </p:nvPr>
+        </p:nvSpPr>
+        <p:spPr/>
+        <p:txBody>
+          <a:bodyPr/>
+          <a:lstStyle/>
+          <a:p>
+            <a:pPr marL="285750" indent="-285750">
+              <a:buFont typeface="Arial" panose="020B0604020202020204" pitchFamily="34" charset="0"/>
+              <a:buChar char="•"/>
+            </a:pPr>
+            <a:r>
+              <a:rPr lang="it-IT" dirty="0" smtClean="0"/>
+              <a:t>Ogni singolo </a:t>
+            </a:r>
+            <a:r>
+              <a:rPr lang="it-IT" cap="all" dirty="0">
+                <a:solidFill>
+                  <a:schemeClr val="tx2"/>
+                </a:solidFill>
+                <a:cs typeface="Arial"/>
+              </a:rPr>
+              <a:t>commit</a:t>
+            </a:r>
+            <a:r>
+              <a:rPr lang="it-IT" dirty="0" smtClean="0"/>
+              <a:t> diventa una </a:t>
+            </a:r>
+            <a:r>
+              <a:rPr lang="it-IT" cap="all" dirty="0">
+                <a:solidFill>
+                  <a:schemeClr val="tx2"/>
+                </a:solidFill>
+                <a:cs typeface="Arial"/>
+              </a:rPr>
+              <a:t>versione rilasciata</a:t>
+            </a:r>
+            <a:r>
+              <a:rPr lang="it-IT" dirty="0" smtClean="0"/>
+              <a:t> senza necessità di intervento umano</a:t>
+            </a:r>
+          </a:p>
+          <a:p>
+            <a:pPr marL="285750" indent="-285750">
+              <a:buFont typeface="Arial" panose="020B0604020202020204" pitchFamily="34" charset="0"/>
+              <a:buChar char="•"/>
+            </a:pPr>
+            <a:r>
+              <a:rPr lang="it-IT" dirty="0" smtClean="0"/>
+              <a:t>Massimo </a:t>
+            </a:r>
+            <a:r>
+              <a:rPr lang="it-IT" cap="all" dirty="0">
+                <a:solidFill>
+                  <a:schemeClr val="tx2"/>
+                </a:solidFill>
+                <a:cs typeface="Arial"/>
+              </a:rPr>
+              <a:t>Focus sul prodotto </a:t>
+            </a:r>
+            <a:r>
+              <a:rPr lang="it-IT" dirty="0" smtClean="0"/>
+              <a:t>e non sulla gestione</a:t>
+            </a:r>
+          </a:p>
+          <a:p>
+            <a:pPr marL="285750" indent="-285750">
+              <a:buFont typeface="Arial" panose="020B0604020202020204" pitchFamily="34" charset="0"/>
+              <a:buChar char="•"/>
+            </a:pPr>
+            <a:r>
+              <a:rPr lang="it-IT" cap="all" dirty="0">
+                <a:solidFill>
+                  <a:schemeClr val="tx2"/>
+                </a:solidFill>
+                <a:cs typeface="Arial"/>
+              </a:rPr>
+              <a:t>Feedback</a:t>
+            </a:r>
+            <a:r>
+              <a:rPr lang="it-IT" dirty="0" smtClean="0"/>
+              <a:t> immediato del cliente</a:t>
+            </a:r>
+          </a:p>
+          <a:p>
+            <a:pPr marL="285750" indent="-285750">
+              <a:buFont typeface="Arial" panose="020B0604020202020204" pitchFamily="34" charset="0"/>
+              <a:buChar char="•"/>
+            </a:pPr>
+            <a:r>
+              <a:rPr lang="it-IT" cap="all" dirty="0">
+                <a:solidFill>
+                  <a:schemeClr val="tx2"/>
+                </a:solidFill>
+                <a:cs typeface="Arial"/>
+              </a:rPr>
+              <a:t>Nessuna attesa </a:t>
+            </a:r>
+            <a:r>
+              <a:rPr lang="it-IT" dirty="0" smtClean="0"/>
+              <a:t>/ burocrazia/ debito tecnico per il passaggio tra ambienti</a:t>
+            </a:r>
+          </a:p>
+          <a:p>
+            <a:pPr marL="285750" indent="-285750">
+              <a:buFont typeface="Arial" panose="020B0604020202020204" pitchFamily="34" charset="0"/>
+              <a:buChar char="•"/>
+            </a:pPr>
+            <a:r>
+              <a:rPr lang="it-IT" dirty="0" smtClean="0"/>
+              <a:t>Aumento notevole della </a:t>
+            </a:r>
+            <a:r>
+              <a:rPr lang="it-IT" cap="all" dirty="0">
+                <a:solidFill>
+                  <a:schemeClr val="tx2"/>
+                </a:solidFill>
+                <a:cs typeface="Arial"/>
+              </a:rPr>
+              <a:t>frequenza</a:t>
+            </a:r>
+            <a:r>
+              <a:rPr lang="it-IT" dirty="0" smtClean="0"/>
+              <a:t> dei rilasci.</a:t>
             </a:r>
             <a:endParaRPr lang="it-IT" dirty="0"/>
           </a:p>
@@ -9176,7 +8741,7 @@
     </p:spTree>
     <p:extLst>
       <p:ext uri="{BB962C8B-B14F-4D97-AF65-F5344CB8AC3E}">
-        <p14:creationId xmlns:p14="http://schemas.microsoft.com/office/powerpoint/2010/main" val="764368643"/>
+        <p14:creationId xmlns:p14="http://schemas.microsoft.com/office/powerpoint/2010/main" val="4073912112"/>
       </p:ext>
     </p:extLst>
   </p:cSld>
@@ -9220,7 +8785,7 @@
       </p:grpSpPr>
       <p:sp>
         <p:nvSpPr>
-          <p:cNvPr id="2" name="Title 1"/>
+          <p:cNvPr id="5" name="Title 4"/>
           <p:cNvSpPr>
             <a:spLocks noGrp="1"/>
           </p:cNvSpPr>
@@ -9235,7 +8800,7 @@
           <a:p>
             <a:r>
               <a:rPr lang="it-IT" dirty="0" smtClean="0"/>
-              <a:t>Continuous testing</a:t>
+              <a:t>Continuous deployment</a:t>
             </a:r>
             <a:endParaRPr lang="it-IT" dirty="0"/>
           </a:p>
@@ -9243,131 +8808,7 @@
       </p:sp>
       <p:sp>
         <p:nvSpPr>
-          <p:cNvPr id="3" name="Text Placeholder 2"/>
-          <p:cNvSpPr>
-            <a:spLocks noGrp="1"/>
-          </p:cNvSpPr>
-          <p:nvPr>
-            <p:ph type="body" sz="quarter" idx="10"/>
-          </p:nvPr>
-        </p:nvSpPr>
-        <p:spPr/>
-        <p:txBody>
-          <a:bodyPr/>
-          <a:lstStyle/>
-          <a:p>
-            <a:r>
-              <a:rPr lang="it-IT" dirty="0" smtClean="0"/>
-              <a:t>Fondamentale strutturare saggiamente i Test:</a:t>
-            </a:r>
-          </a:p>
-          <a:p>
-            <a:endParaRPr lang="it-IT" dirty="0" smtClean="0"/>
-          </a:p>
-          <a:p>
-            <a:pPr marL="285750" indent="-285750">
-              <a:buFont typeface="Arial" panose="020B0604020202020204" pitchFamily="34" charset="0"/>
-              <a:buChar char="•"/>
-            </a:pPr>
-            <a:r>
-              <a:rPr lang="it-IT" dirty="0" smtClean="0"/>
-              <a:t>Avvalersi di un </a:t>
-            </a:r>
-            <a:r>
-              <a:rPr lang="it-IT" cap="all" dirty="0">
-                <a:solidFill>
-                  <a:schemeClr val="tx2"/>
-                </a:solidFill>
-                <a:latin typeface="Arial"/>
-                <a:cs typeface="Arial"/>
-              </a:rPr>
-              <a:t>Framework di Test </a:t>
-            </a:r>
-            <a:r>
-              <a:rPr lang="it-IT" dirty="0" smtClean="0"/>
-              <a:t>(JUnit, ScalaTest, ...)</a:t>
-            </a:r>
-          </a:p>
-          <a:p>
-            <a:pPr marL="285750" indent="-285750">
-              <a:buFont typeface="Arial" panose="020B0604020202020204" pitchFamily="34" charset="0"/>
-              <a:buChar char="•"/>
-            </a:pPr>
-            <a:r>
-              <a:rPr lang="it-IT" dirty="0" smtClean="0"/>
-              <a:t>Dividere i Test per </a:t>
-            </a:r>
-            <a:r>
-              <a:rPr lang="it-IT" cap="all" dirty="0">
-                <a:solidFill>
-                  <a:schemeClr val="tx2"/>
-                </a:solidFill>
-                <a:latin typeface="Arial"/>
-                <a:cs typeface="Arial"/>
-              </a:rPr>
-              <a:t>Feature</a:t>
-            </a:r>
-            <a:r>
-              <a:rPr lang="it-IT" dirty="0" smtClean="0"/>
-              <a:t> (penserà Git a unire al momento dell’integrazione)</a:t>
-            </a:r>
-          </a:p>
-          <a:p>
-            <a:pPr marL="285750" indent="-285750">
-              <a:buFont typeface="Arial" panose="020B0604020202020204" pitchFamily="34" charset="0"/>
-              <a:buChar char="•"/>
-            </a:pPr>
-            <a:r>
-              <a:rPr lang="it-IT" dirty="0" smtClean="0"/>
-              <a:t>Adottare tecniche come la Test Driven Developmen (</a:t>
-            </a:r>
-            <a:r>
-              <a:rPr lang="it-IT" cap="all" dirty="0">
-                <a:solidFill>
-                  <a:schemeClr val="tx2"/>
-                </a:solidFill>
-                <a:latin typeface="Arial"/>
-                <a:cs typeface="Arial"/>
-              </a:rPr>
-              <a:t>TDD</a:t>
-            </a:r>
-            <a:r>
-              <a:rPr lang="it-IT" dirty="0" smtClean="0"/>
-              <a:t>)</a:t>
-            </a:r>
-          </a:p>
-          <a:p>
-            <a:pPr marL="285750" indent="-285750">
-              <a:buFont typeface="Arial" panose="020B0604020202020204" pitchFamily="34" charset="0"/>
-              <a:buChar char="•"/>
-            </a:pPr>
-            <a:r>
-              <a:rPr lang="it-IT" dirty="0" smtClean="0"/>
-              <a:t>Tempo di esecuzione della batteria di test </a:t>
-            </a:r>
-            <a:r>
-              <a:rPr lang="it-IT" cap="all" dirty="0">
-                <a:solidFill>
-                  <a:schemeClr val="tx2"/>
-                </a:solidFill>
-                <a:latin typeface="Arial"/>
-                <a:cs typeface="Arial"/>
-              </a:rPr>
-              <a:t>&lt; 10 minuti </a:t>
-            </a:r>
-            <a:r>
-              <a:rPr lang="it-IT" sz="1200" dirty="0" smtClean="0"/>
-              <a:t>(XP)</a:t>
-            </a:r>
-          </a:p>
-          <a:p>
-            <a:endParaRPr lang="it-IT" dirty="0"/>
-          </a:p>
-        </p:txBody>
-      </p:sp>
-      <p:sp>
-        <p:nvSpPr>
-          <p:cNvPr id="4" name="Subtitle 3"/>
+          <p:cNvPr id="6" name="Subtitle 5"/>
           <p:cNvSpPr>
             <a:spLocks noGrp="1"/>
           </p:cNvSpPr>
@@ -9382,8 +8823,71 @@
           <a:p>
             <a:r>
               <a:rPr lang="it-IT" dirty="0" smtClean="0"/>
-              <a:t>Strutturare i test</a:t>
-            </a:r>
+              <a:t>Vantaggi pratici</a:t>
+            </a:r>
+            <a:endParaRPr lang="it-IT" dirty="0"/>
+          </a:p>
+        </p:txBody>
+      </p:sp>
+      <p:sp>
+        <p:nvSpPr>
+          <p:cNvPr id="7" name="Content Placeholder 6"/>
+          <p:cNvSpPr>
+            <a:spLocks noGrp="1"/>
+          </p:cNvSpPr>
+          <p:nvPr>
+            <p:ph idx="10"/>
+          </p:nvPr>
+        </p:nvSpPr>
+        <p:spPr/>
+        <p:txBody>
+          <a:bodyPr/>
+          <a:lstStyle/>
+          <a:p>
+            <a:pPr>
+              <a:buFont typeface="Arial" panose="020B0604020202020204" pitchFamily="34" charset="0"/>
+              <a:buChar char="•"/>
+            </a:pPr>
+            <a:r>
+              <a:rPr lang="it-IT" dirty="0" smtClean="0"/>
+              <a:t>Ambienti standardizzati (CM) dallo sviluppo alla produzione</a:t>
+            </a:r>
+          </a:p>
+          <a:p>
+            <a:pPr>
+              <a:buFont typeface="Arial" panose="020B0604020202020204" pitchFamily="34" charset="0"/>
+              <a:buChar char="•"/>
+            </a:pPr>
+            <a:r>
+              <a:rPr lang="it-IT" dirty="0" smtClean="0"/>
+              <a:t>Test standardizzati (CT) tra gli ambienti, valore potenziale crescente</a:t>
+            </a:r>
+          </a:p>
+          <a:p>
+            <a:pPr>
+              <a:buFont typeface="Arial" panose="020B0604020202020204" pitchFamily="34" charset="0"/>
+              <a:buChar char="•"/>
+            </a:pPr>
+            <a:r>
+              <a:rPr lang="it-IT" dirty="0" smtClean="0"/>
+              <a:t>Build unica (CI) , in ambiente identico alla produzione</a:t>
+            </a:r>
+          </a:p>
+          <a:p>
+            <a:pPr>
+              <a:buFont typeface="Arial" panose="020B0604020202020204" pitchFamily="34" charset="0"/>
+              <a:buChar char="•"/>
+            </a:pPr>
+            <a:r>
+              <a:rPr lang="it-IT" dirty="0" smtClean="0"/>
+              <a:t>Deploy automatico con componenti di alto livello (CM)</a:t>
+            </a:r>
+          </a:p>
+          <a:p>
+            <a:pPr>
+              <a:buFont typeface="Arial" panose="020B0604020202020204" pitchFamily="34" charset="0"/>
+              <a:buChar char="•"/>
+            </a:pPr>
             <a:endParaRPr lang="it-IT" dirty="0"/>
           </a:p>
         </p:txBody>
@@ -9391,21 +8895,20 @@
     </p:spTree>
     <p:extLst>
       <p:ext uri="{BB962C8B-B14F-4D97-AF65-F5344CB8AC3E}">
-        <p14:creationId xmlns:p14="http://schemas.microsoft.com/office/powerpoint/2010/main" val="3021541439"/>
+        <p14:creationId xmlns:p14="http://schemas.microsoft.com/office/powerpoint/2010/main" val="718054751"/>
       </p:ext>
     </p:extLst>
   </p:cSld>
   <p:clrMapOvr>
     <a:masterClrMapping/>
   </p:clrMapOvr>
-  <mc:AlternateContent xmlns:mc="http://schemas.openxmlformats.org/markup-compatibility/2006" xmlns:p14="http://schemas.microsoft.com/office/powerpoint/2010/main">
-    <mc:Choice Requires="p14">
-      <p:transition spd="slow" p14:dur="2000"/>
-    </mc:Choice>
-    <mc:Fallback xmlns="">
-      <p:transition spd="slow"/>
-    </mc:Fallback>
-  </mc:AlternateContent>
+  <p:timing>
+    <p:tnLst>
+      <p:par>
+        <p:cTn id="1" dur="indefinite" restart="never" nodeType="tmRoot"/>
+      </p:par>
+    </p:tnLst>
+  </p:timing>
 </p:sld>
 </file>
 
@@ -9428,27 +8931,175 @@
       </p:grpSpPr>
       <p:sp>
         <p:nvSpPr>
-          <p:cNvPr id="6" name="Title 5"/>
+          <p:cNvPr id="5" name="Content Placeholder 4"/>
           <p:cNvSpPr>
             <a:spLocks noGrp="1"/>
           </p:cNvSpPr>
           <p:nvPr>
-            <p:ph type="ctrTitle"/>
+            <p:ph sz="half" idx="1"/>
           </p:nvPr>
         </p:nvSpPr>
         <p:spPr>
           <a:xfrm>
-            <a:off x="559165" y="1953789"/>
-            <a:ext cx="8012512" cy="1088787"/>
+            <a:off x="573852" y="1259138"/>
+            <a:ext cx="3781060" cy="3378143"/>
           </a:xfrm>
         </p:spPr>
         <p:txBody>
           <a:bodyPr/>
           <a:lstStyle/>
           <a:p>
-            <a:r>
-              <a:rPr lang="it-IT" dirty="0" smtClean="0"/>
-              <a:t>Caso d’uso</a:t>
+            <a:pPr marL="285750" indent="-285750">
+              <a:buFont typeface="Arial" panose="020B0604020202020204" pitchFamily="34" charset="0"/>
+              <a:buChar char="•"/>
+            </a:pPr>
+            <a:r>
+              <a:rPr lang="it-IT" sz="1800" cap="all" dirty="0">
+                <a:solidFill>
+                  <a:schemeClr val="tx2"/>
+                </a:solidFill>
+                <a:cs typeface="Arial"/>
+              </a:rPr>
+              <a:t>Due ambienti paralleli </a:t>
+            </a:r>
+            <a:r>
+              <a:rPr lang="it-IT" dirty="0" smtClean="0"/>
+              <a:t>(Green e Blue) per la corrente e la nuova versione.</a:t>
+            </a:r>
+          </a:p>
+          <a:p>
+            <a:pPr marL="285750" indent="-285750">
+              <a:buFont typeface="Arial" panose="020B0604020202020204" pitchFamily="34" charset="0"/>
+              <a:buChar char="•"/>
+            </a:pPr>
+            <a:endParaRPr lang="it-IT" dirty="0"/>
+          </a:p>
+          <a:p>
+            <a:pPr marL="285750" indent="-285750">
+              <a:buFont typeface="Arial" panose="020B0604020202020204" pitchFamily="34" charset="0"/>
+              <a:buChar char="•"/>
+            </a:pPr>
+            <a:r>
+              <a:rPr lang="it-IT" sz="1800" cap="all" dirty="0">
+                <a:solidFill>
+                  <a:schemeClr val="tx2"/>
+                </a:solidFill>
+                <a:cs typeface="Arial"/>
+              </a:rPr>
+              <a:t>Server Proxy </a:t>
+            </a:r>
+            <a:r>
+              <a:rPr lang="it-IT" dirty="0" smtClean="0"/>
+              <a:t>gestisce il dirottamento incrementale degli utenti</a:t>
+            </a:r>
+          </a:p>
+          <a:p>
+            <a:pPr marL="285750" indent="-285750">
+              <a:buFont typeface="Arial" panose="020B0604020202020204" pitchFamily="34" charset="0"/>
+              <a:buChar char="•"/>
+            </a:pPr>
+            <a:endParaRPr lang="it-IT" dirty="0"/>
+          </a:p>
+          <a:p>
+            <a:pPr marL="285750" indent="-285750">
+              <a:buFont typeface="Arial" panose="020B0604020202020204" pitchFamily="34" charset="0"/>
+              <a:buChar char="•"/>
+            </a:pPr>
+            <a:r>
+              <a:rPr lang="it-IT" dirty="0" smtClean="0"/>
+              <a:t>Monitoring della nuova istanza allo scalare dell’utenza</a:t>
+            </a:r>
+          </a:p>
+          <a:p>
+            <a:pPr marL="285750" indent="-285750">
+              <a:buFont typeface="Arial" panose="020B0604020202020204" pitchFamily="34" charset="0"/>
+              <a:buChar char="•"/>
+            </a:pPr>
+            <a:endParaRPr lang="it-IT" dirty="0"/>
+          </a:p>
+          <a:p>
+            <a:pPr marL="285750" indent="-285750">
+              <a:buFont typeface="Arial" panose="020B0604020202020204" pitchFamily="34" charset="0"/>
+              <a:buChar char="•"/>
+            </a:pPr>
+            <a:r>
+              <a:rPr lang="it-IT" dirty="0" smtClean="0"/>
+              <a:t>Al termine, ruoli invertiti.</a:t>
+            </a:r>
+          </a:p>
+        </p:txBody>
+      </p:sp>
+      <p:sp>
+        <p:nvSpPr>
+          <p:cNvPr id="2" name="Title 1"/>
+          <p:cNvSpPr>
+            <a:spLocks noGrp="1"/>
+          </p:cNvSpPr>
+          <p:nvPr>
+            <p:ph type="title"/>
+          </p:nvPr>
+        </p:nvSpPr>
+        <p:spPr/>
+        <p:txBody>
+          <a:bodyPr/>
+          <a:lstStyle/>
+          <a:p>
+            <a:r>
+              <a:rPr lang="it-IT" dirty="0"/>
+              <a:t>Blue / green deployment</a:t>
+            </a:r>
+            <a:endParaRPr lang="it-IT" dirty="0"/>
+          </a:p>
+        </p:txBody>
+      </p:sp>
+      <p:pic>
+        <p:nvPicPr>
+          <p:cNvPr id="8" name="Picture Placeholder 7"/>
+          <p:cNvPicPr>
+            <a:picLocks noGrp="1" noChangeAspect="1"/>
+          </p:cNvPicPr>
+          <p:nvPr>
+            <p:ph type="pic" sz="quarter" idx="11"/>
+          </p:nvPr>
+        </p:nvPicPr>
+        <p:blipFill>
+          <a:blip r:embed="rId2">
+            <a:extLst>
+              <a:ext uri="{28A0092B-C50C-407E-A947-70E740481C1C}">
+                <a14:useLocalDpi xmlns:a14="http://schemas.microsoft.com/office/drawing/2010/main" val="0"/>
+              </a:ext>
+            </a:extLst>
+          </a:blip>
+          <a:srcRect l="1008" r="1008"/>
+          <a:stretch>
+            <a:fillRect/>
+          </a:stretch>
+        </p:blipFill>
+        <p:spPr>
+          <a:xfrm>
+            <a:off x="4453588" y="1259138"/>
+            <a:ext cx="4690412" cy="3378144"/>
+          </a:xfrm>
+        </p:spPr>
+      </p:pic>
+      <p:sp>
+        <p:nvSpPr>
+          <p:cNvPr id="4" name="Subtitle 3"/>
+          <p:cNvSpPr>
+            <a:spLocks noGrp="1"/>
+          </p:cNvSpPr>
+          <p:nvPr>
+            <p:ph type="subTitle" idx="12"/>
+          </p:nvPr>
+        </p:nvSpPr>
+        <p:spPr/>
+        <p:txBody>
+          <a:bodyPr/>
+          <a:lstStyle/>
+          <a:p>
+            <a:r>
+              <a:rPr lang="it-IT" dirty="0" smtClean="0"/>
+              <a:t>Gestire il deploy</a:t>
             </a:r>
             <a:endParaRPr lang="it-IT" dirty="0"/>
           </a:p>
@@ -9457,13 +9108,21 @@
     </p:spTree>
     <p:extLst>
       <p:ext uri="{BB962C8B-B14F-4D97-AF65-F5344CB8AC3E}">
-        <p14:creationId xmlns:p14="http://schemas.microsoft.com/office/powerpoint/2010/main" val="3803834758"/>
+        <p14:creationId xmlns:p14="http://schemas.microsoft.com/office/powerpoint/2010/main" val="223478040"/>
       </p:ext>
     </p:extLst>
   </p:cSld>
   <p:clrMapOvr>
     <a:masterClrMapping/>
   </p:clrMapOvr>
+  <mc:AlternateContent xmlns:mc="http://schemas.openxmlformats.org/markup-compatibility/2006" xmlns:p14="http://schemas.microsoft.com/office/powerpoint/2010/main">
+    <mc:Choice Requires="p14">
+      <p:transition spd="slow" p14:dur="2000"/>
+    </mc:Choice>
+    <mc:Fallback xmlns="">
+      <p:transition spd="slow"/>
+    </mc:Fallback>
+  </mc:AlternateContent>
   <p:timing>
     <p:tnLst>
       <p:par>
@@ -9513,6 +9172,71 @@
           <a:p>
             <a:r>
               <a:rPr lang="it-IT" dirty="0" smtClean="0"/>
+              <a:t>Caso d’uso</a:t>
+            </a:r>
+            <a:endParaRPr lang="it-IT" dirty="0"/>
+          </a:p>
+        </p:txBody>
+      </p:sp>
+    </p:spTree>
+    <p:extLst>
+      <p:ext uri="{BB962C8B-B14F-4D97-AF65-F5344CB8AC3E}">
+        <p14:creationId xmlns:p14="http://schemas.microsoft.com/office/powerpoint/2010/main" val="3803834758"/>
+      </p:ext>
+    </p:extLst>
+  </p:cSld>
+  <p:clrMapOvr>
+    <a:masterClrMapping/>
+  </p:clrMapOvr>
+  <p:timing>
+    <p:tnLst>
+      <p:par>
+        <p:cTn id="1" dur="indefinite" restart="never" nodeType="tmRoot"/>
+      </p:par>
+    </p:tnLst>
+  </p:timing>
+</p:sld>
+</file>
+
+<file path=ppt/slides/slide25.xml><?xml version="1.0" encoding="utf-8"?>
+<p:sld xmlns:a="http://schemas.openxmlformats.org/drawingml/2006/main" xmlns:r="http://schemas.openxmlformats.org/officeDocument/2006/relationships" xmlns:p="http://schemas.openxmlformats.org/presentationml/2006/main">
+  <p:cSld>
+    <p:spTree>
+      <p:nvGrpSpPr>
+        <p:cNvPr id="1" name=""/>
+        <p:cNvGrpSpPr/>
+        <p:nvPr/>
+      </p:nvGrpSpPr>
+      <p:grpSpPr>
+        <a:xfrm>
+          <a:off x="0" y="0"/>
+          <a:ext cx="0" cy="0"/>
+          <a:chOff x="0" y="0"/>
+          <a:chExt cx="0" cy="0"/>
+        </a:xfrm>
+      </p:grpSpPr>
+      <p:sp>
+        <p:nvSpPr>
+          <p:cNvPr id="6" name="Title 5"/>
+          <p:cNvSpPr>
+            <a:spLocks noGrp="1"/>
+          </p:cNvSpPr>
+          <p:nvPr>
+            <p:ph type="ctrTitle"/>
+          </p:nvPr>
+        </p:nvSpPr>
+        <p:spPr>
+          <a:xfrm>
+            <a:off x="559165" y="1953789"/>
+            <a:ext cx="8012512" cy="1088787"/>
+          </a:xfrm>
+        </p:spPr>
+        <p:txBody>
+          <a:bodyPr/>
+          <a:lstStyle/>
+          <a:p>
+            <a:r>
+              <a:rPr lang="it-IT" dirty="0" smtClean="0"/>
               <a:t>PRATICa</a:t>
             </a:r>
             <a:endParaRPr lang="it-IT" dirty="0"/>
@@ -9539,7 +9263,7 @@
 </p:sld>
 </file>
 
-<file path=ppt/slides/slide25.xml><?xml version="1.0" encoding="utf-8"?>
+<file path=ppt/slides/slide26.xml><?xml version="1.0" encoding="utf-8"?>
 <p:sld xmlns:a="http://schemas.openxmlformats.org/drawingml/2006/main" xmlns:r="http://schemas.openxmlformats.org/officeDocument/2006/relationships" xmlns:p="http://schemas.openxmlformats.org/presentationml/2006/main">
   <p:cSld>
     <p:spTree>
@@ -10064,21 +9788,67 @@
           <a:p>
             <a:r>
               <a:rPr lang="it-IT" sz="2800" dirty="0" smtClean="0"/>
-              <a:t>«releasing software is too often an art; it should be an </a:t>
-            </a:r>
-            <a:r>
-              <a:rPr lang="it-IT" sz="2800" b="1" dirty="0">
+              <a:t>«releasing not ‘’can we build </a:t>
+            </a:r>
+            <a:r>
+              <a:rPr lang="it-IT" sz="2800" dirty="0"/>
+              <a:t>it</a:t>
+            </a:r>
+            <a:r>
+              <a:rPr lang="it-IT" sz="2800" dirty="0" smtClean="0"/>
+              <a:t>?‘’ </a:t>
+            </a:r>
+            <a:r>
+              <a:rPr lang="it-IT" sz="2800" dirty="0" smtClean="0"/>
+              <a:t>but ‘’</a:t>
+            </a:r>
+            <a:r>
+              <a:rPr lang="it-IT" sz="2800" b="1" dirty="0" smtClean="0">
                 <a:solidFill>
                   <a:schemeClr val="tx2"/>
                 </a:solidFill>
                 <a:latin typeface="Arial"/>
                 <a:cs typeface="Arial"/>
               </a:rPr>
-              <a:t>engineering discipline</a:t>
+              <a:t>should</a:t>
             </a:r>
             <a:r>
               <a:rPr lang="it-IT" sz="2800" dirty="0" smtClean="0"/>
-              <a:t>»</a:t>
+              <a:t> </a:t>
+            </a:r>
+            <a:r>
+              <a:rPr lang="it-IT" sz="2800" b="1" dirty="0">
+                <a:solidFill>
+                  <a:schemeClr val="tx2"/>
+                </a:solidFill>
+                <a:latin typeface="Arial"/>
+                <a:cs typeface="Arial"/>
+              </a:rPr>
+              <a:t>we build </a:t>
+            </a:r>
+            <a:r>
+              <a:rPr lang="it-IT" sz="2800" b="1" dirty="0">
+                <a:solidFill>
+                  <a:schemeClr val="tx2"/>
+                </a:solidFill>
+                <a:latin typeface="Arial"/>
+                <a:cs typeface="Arial"/>
+              </a:rPr>
+              <a:t>it</a:t>
+            </a:r>
+            <a:r>
+              <a:rPr lang="it-IT" sz="2800" b="1" dirty="0">
+                <a:solidFill>
+                  <a:schemeClr val="tx2"/>
+                </a:solidFill>
+                <a:latin typeface="Arial"/>
+                <a:cs typeface="Arial"/>
+              </a:rPr>
+              <a:t>?</a:t>
+            </a:r>
+            <a:r>
+              <a:rPr lang="it-IT" sz="2800" dirty="0" smtClean="0"/>
+              <a:t>‘’»</a:t>
             </a:r>
             <a:endParaRPr lang="it-IT" sz="2800" dirty="0"/>
           </a:p>
@@ -10093,7 +9863,7 @@
         <p:spPr>
           <a:xfrm>
             <a:off x="4894342" y="3152412"/>
-            <a:ext cx="3433933" cy="646331"/>
+            <a:ext cx="3433933" cy="461665"/>
           </a:xfrm>
           <a:prstGeom prst="rect">
             <a:avLst/>
@@ -10107,7 +9877,7 @@
           <a:p>
             <a:r>
               <a:rPr lang="it-IT" sz="1200" i="1" dirty="0" smtClean="0"/>
-              <a:t>David Farley – Continuous Delivery: Reliable Software Releases through Build, Test and Deployment Automation</a:t>
+              <a:t>Jez Humble – Lean Enterprise: How High Performance Oganizations Innovate at Scale</a:t>
             </a:r>
             <a:endParaRPr lang="it-IT" sz="1200" i="1" dirty="0"/>
           </a:p>
@@ -10189,28 +9959,21 @@
           <a:lstStyle/>
           <a:p>
             <a:r>
-              <a:rPr lang="it-IT" sz="1800" b="1" cap="all" dirty="0" smtClean="0">
+              <a:rPr lang="it-IT" dirty="0" smtClean="0"/>
+              <a:t>La </a:t>
+            </a:r>
+            <a:r>
+              <a:rPr lang="it-IT" b="1" cap="all" dirty="0">
                 <a:solidFill>
                   <a:schemeClr val="tx2"/>
                 </a:solidFill>
                 <a:cs typeface="Arial"/>
               </a:rPr>
-              <a:t>master </a:t>
-            </a:r>
-            <a:r>
-              <a:rPr lang="it-IT" sz="1800" b="1" cap="all" dirty="0">
-                <a:solidFill>
-                  <a:schemeClr val="tx2"/>
-                </a:solidFill>
-                <a:cs typeface="Arial"/>
-              </a:rPr>
-              <a:t>Branch</a:t>
-            </a:r>
-          </a:p>
-          <a:p>
-            <a:r>
-              <a:rPr lang="it-IT" dirty="0" smtClean="0"/>
-              <a:t>La Pipeline di CI assicura che :</a:t>
+              <a:t>Pipeline di CI </a:t>
+            </a:r>
+            <a:r>
+              <a:rPr lang="it-IT" dirty="0" smtClean="0"/>
+              <a:t>garantisce che:</a:t>
             </a:r>
           </a:p>
           <a:p>
@@ -10220,7 +9983,7 @@
             </a:pPr>
             <a:r>
               <a:rPr lang="it-IT" dirty="0" smtClean="0"/>
-              <a:t>Il master contenga la versione più aggiornata del sistema</a:t>
+              <a:t>Ogni singola Feature rispetti le specifiche di Test</a:t>
             </a:r>
           </a:p>
           <a:p>
@@ -10230,7 +9993,7 @@
             </a:pPr>
             <a:r>
               <a:rPr lang="it-IT" dirty="0" smtClean="0"/>
-              <a:t>Ogni Feature funziona</a:t>
+              <a:t>Il sistema sia strutturato in maniera modulare e incrementale</a:t>
             </a:r>
           </a:p>
           <a:p>
@@ -10238,30 +10001,42 @@
               <a:buFont typeface="Arial" panose="020B0604020202020204" pitchFamily="34" charset="0"/>
               <a:buChar char="•"/>
             </a:pPr>
-            <a:endParaRPr lang="it-IT" dirty="0"/>
-          </a:p>
-          <a:p>
-            <a:endParaRPr lang="it-IT" dirty="0"/>
-          </a:p>
-          <a:p>
-            <a:r>
-              <a:rPr lang="it-IT" sz="1800" b="1" cap="all" dirty="0">
+            <a:r>
+              <a:rPr lang="it-IT" dirty="0" smtClean="0"/>
+              <a:t>Il </a:t>
+            </a:r>
+            <a:r>
+              <a:rPr lang="it-IT" cap="all" dirty="0">
                 <a:solidFill>
                   <a:schemeClr val="tx2"/>
                 </a:solidFill>
-                <a:latin typeface="Arial"/>
                 <a:cs typeface="Arial"/>
               </a:rPr>
-              <a:t>Feature Branch</a:t>
-            </a:r>
-          </a:p>
-          <a:p>
-            <a:r>
-              <a:rPr lang="it-IT" dirty="0" smtClean="0"/>
-              <a:t>Ramo paralllo al master usato per sviluppare una specifica feature in maniera sicura.</a:t>
-            </a:r>
-          </a:p>
-          <a:p>
+              <a:t>Master Branch </a:t>
+            </a:r>
+            <a:r>
+              <a:rPr lang="it-IT" dirty="0" smtClean="0"/>
+              <a:t>sia costantemente aggiornato e (teoricamente) </a:t>
+            </a:r>
+            <a:r>
+              <a:rPr lang="it-IT" cap="all" dirty="0">
+                <a:solidFill>
+                  <a:schemeClr val="tx2"/>
+                </a:solidFill>
+                <a:cs typeface="Arial"/>
+              </a:rPr>
+              <a:t>rilasciabile</a:t>
+            </a:r>
+          </a:p>
+          <a:p>
+            <a:endParaRPr lang="it-IT" dirty="0" smtClean="0"/>
+          </a:p>
+          <a:p>
+            <a:pPr algn="ctr"/>
+            <a:r>
+              <a:rPr lang="it-IT" dirty="0" smtClean="0"/>
+              <a:t>Quando è conveniente Rilasciare una Feature ???</a:t>
+            </a:r>
             <a:endParaRPr lang="it-IT" dirty="0"/>
           </a:p>
           <a:p>
@@ -10346,7 +10121,7 @@
           <a:p>
             <a:r>
               <a:rPr lang="it-IT" dirty="0" smtClean="0"/>
-              <a:t>Continuous Integration</a:t>
+              <a:t>DEPLOY E RELEASE</a:t>
             </a:r>
             <a:endParaRPr lang="it-IT" dirty="0"/>
           </a:p>
@@ -10354,7 +10129,87 @@
       </p:sp>
       <p:sp>
         <p:nvSpPr>
-          <p:cNvPr id="6" name="Subtitle 5"/>
+          <p:cNvPr id="3" name="Text Placeholder 2"/>
+          <p:cNvSpPr>
+            <a:spLocks noGrp="1"/>
+          </p:cNvSpPr>
+          <p:nvPr>
+            <p:ph type="body" sz="quarter" idx="10"/>
+          </p:nvPr>
+        </p:nvSpPr>
+        <p:spPr/>
+        <p:txBody>
+          <a:bodyPr/>
+          <a:lstStyle/>
+          <a:p>
+            <a:r>
+              <a:rPr lang="it-IT" b="1" cap="all" dirty="0">
+                <a:solidFill>
+                  <a:schemeClr val="tx2"/>
+                </a:solidFill>
+                <a:cs typeface="Arial"/>
+              </a:rPr>
+              <a:t>DEPLOY</a:t>
+            </a:r>
+          </a:p>
+          <a:p>
+            <a:r>
+              <a:rPr lang="it-IT" dirty="0" smtClean="0"/>
+              <a:t>Rilascio di una nuova versione di un </a:t>
+            </a:r>
+            <a:r>
+              <a:rPr lang="it-IT" dirty="0" smtClean="0"/>
+              <a:t>componente software in produzione </a:t>
+            </a:r>
+            <a:endParaRPr lang="it-IT" dirty="0" smtClean="0"/>
+          </a:p>
+          <a:p>
+            <a:endParaRPr lang="it-IT" dirty="0" smtClean="0"/>
+          </a:p>
+          <a:p>
+            <a:r>
+              <a:rPr lang="it-IT" dirty="0" smtClean="0"/>
+              <a:t>Problematiche:</a:t>
+            </a:r>
+          </a:p>
+          <a:p>
+            <a:pPr marL="285750" indent="-285750">
+              <a:buFont typeface="Arial" panose="020B0604020202020204" pitchFamily="34" charset="0"/>
+              <a:buChar char="•"/>
+            </a:pPr>
+            <a:r>
+              <a:rPr lang="it-IT" dirty="0" smtClean="0"/>
+              <a:t>Funzionamento (assicurato dalla pipeline)</a:t>
+            </a:r>
+          </a:p>
+          <a:p>
+            <a:pPr marL="285750" indent="-285750">
+              <a:buFont typeface="Arial" panose="020B0604020202020204" pitchFamily="34" charset="0"/>
+              <a:buChar char="•"/>
+            </a:pPr>
+            <a:r>
+              <a:rPr lang="it-IT" dirty="0" smtClean="0"/>
+              <a:t>Trasferimento Pratico della nuova versione (Ops)</a:t>
+            </a:r>
+          </a:p>
+          <a:p>
+            <a:pPr marL="285750" indent="-285750">
+              <a:buFont typeface="Arial" panose="020B0604020202020204" pitchFamily="34" charset="0"/>
+              <a:buChar char="•"/>
+            </a:pPr>
+            <a:r>
+              <a:rPr lang="it-IT" dirty="0" smtClean="0"/>
+              <a:t>Gestione del periodo di Down</a:t>
+            </a:r>
+          </a:p>
+          <a:p>
+            <a:endParaRPr lang="it-IT" dirty="0"/>
+          </a:p>
+        </p:txBody>
+      </p:sp>
+      <p:sp>
+        <p:nvSpPr>
+          <p:cNvPr id="4" name="Subtitle 3"/>
           <p:cNvSpPr>
             <a:spLocks noGrp="1"/>
           </p:cNvSpPr>
@@ -10369,116 +10224,7 @@
           <a:p>
             <a:r>
               <a:rPr lang="it-IT" dirty="0" smtClean="0"/>
-              <a:t>Version control system</a:t>
-            </a:r>
-            <a:endParaRPr lang="it-IT" dirty="0"/>
-          </a:p>
-        </p:txBody>
-      </p:sp>
-      <p:sp>
-        <p:nvSpPr>
-          <p:cNvPr id="4" name="Content Placeholder 3"/>
-          <p:cNvSpPr>
-            <a:spLocks noGrp="1"/>
-          </p:cNvSpPr>
-          <p:nvPr>
-            <p:ph idx="10"/>
-          </p:nvPr>
-        </p:nvSpPr>
-        <p:spPr/>
-        <p:txBody>
-          <a:bodyPr/>
-          <a:lstStyle/>
-          <a:p>
-            <a:pPr marL="285750" indent="-285750">
-              <a:buFont typeface="Arial" panose="020B0604020202020204" pitchFamily="34" charset="0"/>
-              <a:buChar char="•"/>
-            </a:pPr>
-            <a:r>
-              <a:rPr lang="it-IT" dirty="0" smtClean="0"/>
-              <a:t>Suddividere il lavoro in Features standalone</a:t>
-            </a:r>
-          </a:p>
-          <a:p>
-            <a:pPr marL="285750" indent="-285750">
-              <a:buFont typeface="Arial" panose="020B0604020202020204" pitchFamily="34" charset="0"/>
-              <a:buChar char="•"/>
-            </a:pPr>
-            <a:r>
-              <a:rPr lang="it-IT" dirty="0" smtClean="0"/>
-              <a:t>Strutturare un </a:t>
-            </a:r>
-            <a:r>
-              <a:rPr lang="it-IT" cap="all" dirty="0">
-                <a:solidFill>
-                  <a:schemeClr val="tx2"/>
-                </a:solidFill>
-                <a:latin typeface="Arial"/>
-                <a:cs typeface="Arial"/>
-              </a:rPr>
-              <a:t>Version Control System (VCS) </a:t>
-            </a:r>
-            <a:r>
-              <a:rPr lang="it-IT" dirty="0" smtClean="0"/>
-              <a:t>che mantenga la versione finale del progetto (Master Branch) e il flusso di produzione</a:t>
-            </a:r>
-          </a:p>
-          <a:p>
-            <a:pPr marL="285750" indent="-285750">
-              <a:buFont typeface="Arial" panose="020B0604020202020204" pitchFamily="34" charset="0"/>
-              <a:buChar char="•"/>
-            </a:pPr>
-            <a:r>
-              <a:rPr lang="it-IT" dirty="0" smtClean="0"/>
-              <a:t>Creare Branches per ogni features</a:t>
-            </a:r>
-          </a:p>
-          <a:p>
-            <a:pPr marL="285750" indent="-285750">
-              <a:buFont typeface="Arial" panose="020B0604020202020204" pitchFamily="34" charset="0"/>
-              <a:buChar char="•"/>
-            </a:pPr>
-            <a:r>
-              <a:rPr lang="it-IT" b="1" cap="all" dirty="0">
-                <a:solidFill>
-                  <a:schemeClr val="tx2"/>
-                </a:solidFill>
-                <a:latin typeface="Arial"/>
-                <a:cs typeface="Arial"/>
-              </a:rPr>
-              <a:t>Integrare</a:t>
-            </a:r>
-            <a:r>
-              <a:rPr lang="it-IT" cap="all" dirty="0">
-                <a:solidFill>
-                  <a:schemeClr val="tx2"/>
-                </a:solidFill>
-                <a:latin typeface="Arial"/>
-                <a:cs typeface="Arial"/>
-              </a:rPr>
-              <a:t> </a:t>
-            </a:r>
-            <a:r>
-              <a:rPr lang="it-IT" dirty="0"/>
-              <a:t>i Features Branch nel Master Branch </a:t>
-            </a:r>
-            <a:r>
-              <a:rPr lang="it-IT" b="1" cap="all" dirty="0">
-                <a:solidFill>
-                  <a:schemeClr val="tx2"/>
-                </a:solidFill>
-                <a:latin typeface="Arial"/>
-                <a:cs typeface="Arial"/>
-              </a:rPr>
-              <a:t>frequentemente</a:t>
-            </a:r>
-            <a:r>
-              <a:rPr lang="it-IT" sz="1600" dirty="0" smtClean="0"/>
-              <a:t> </a:t>
-            </a:r>
-            <a:r>
-              <a:rPr lang="it-IT" dirty="0" smtClean="0"/>
-              <a:t>(almeno 1/gg) in modo che sia sempre pronto al Release.</a:t>
+              <a:t>Simili ma differenti</a:t>
             </a:r>
             <a:endParaRPr lang="it-IT" dirty="0"/>
           </a:p>
@@ -10487,13 +10233,21 @@
     </p:spTree>
     <p:extLst>
       <p:ext uri="{BB962C8B-B14F-4D97-AF65-F5344CB8AC3E}">
-        <p14:creationId xmlns:p14="http://schemas.microsoft.com/office/powerpoint/2010/main" val="3775201042"/>
+        <p14:creationId xmlns:p14="http://schemas.microsoft.com/office/powerpoint/2010/main" val="2472436981"/>
       </p:ext>
     </p:extLst>
   </p:cSld>
   <p:clrMapOvr>
     <a:masterClrMapping/>
   </p:clrMapOvr>
+  <mc:AlternateContent xmlns:mc="http://schemas.openxmlformats.org/markup-compatibility/2006" xmlns:p14="http://schemas.microsoft.com/office/powerpoint/2010/main">
+    <mc:Choice Requires="p14">
+      <p:transition spd="slow" p14:dur="2000"/>
+    </mc:Choice>
+    <mc:Fallback xmlns="">
+      <p:transition spd="slow"/>
+    </mc:Fallback>
+  </mc:AlternateContent>
   <p:timing>
     <p:tnLst>
       <p:par>
@@ -10538,7 +10292,7 @@
           <a:p>
             <a:r>
               <a:rPr lang="it-IT" dirty="0" smtClean="0"/>
-              <a:t>Continuous Integration</a:t>
+              <a:t>DEPLOY E RELEASE</a:t>
             </a:r>
             <a:endParaRPr lang="it-IT" dirty="0"/>
           </a:p>
@@ -10546,7 +10300,82 @@
       </p:sp>
       <p:sp>
         <p:nvSpPr>
-          <p:cNvPr id="3" name="Subtitle 2"/>
+          <p:cNvPr id="3" name="Text Placeholder 2"/>
+          <p:cNvSpPr>
+            <a:spLocks noGrp="1"/>
+          </p:cNvSpPr>
+          <p:nvPr>
+            <p:ph type="body" sz="quarter" idx="10"/>
+          </p:nvPr>
+        </p:nvSpPr>
+        <p:spPr/>
+        <p:txBody>
+          <a:bodyPr/>
+          <a:lstStyle/>
+          <a:p>
+            <a:r>
+              <a:rPr lang="it-IT" b="1" cap="all" dirty="0" smtClean="0">
+                <a:solidFill>
+                  <a:schemeClr val="tx2"/>
+                </a:solidFill>
+                <a:cs typeface="Arial"/>
+              </a:rPr>
+              <a:t>release</a:t>
+            </a:r>
+            <a:endParaRPr lang="it-IT" b="1" cap="all" dirty="0">
+              <a:solidFill>
+                <a:schemeClr val="tx2"/>
+              </a:solidFill>
+              <a:cs typeface="Arial"/>
+            </a:endParaRPr>
+          </a:p>
+          <a:p>
+            <a:r>
+              <a:rPr lang="it-IT" dirty="0" smtClean="0"/>
+              <a:t>Abilitare una determinata Feature del prodotto in produzione, in modo che gli utenti possano usarla in modo trasparente.</a:t>
+            </a:r>
+          </a:p>
+          <a:p>
+            <a:endParaRPr lang="it-IT" dirty="0" smtClean="0"/>
+          </a:p>
+          <a:p>
+            <a:pPr algn="ctr"/>
+            <a:r>
+              <a:rPr lang="it-IT" dirty="0" smtClean="0"/>
+              <a:t>Nel momento in cui il prodotto è già in produzione</a:t>
+            </a:r>
+          </a:p>
+          <a:p>
+            <a:pPr algn="ctr"/>
+            <a:r>
+              <a:rPr lang="it-IT" dirty="0" smtClean="0"/>
+              <a:t> e la pipeline assicura il funzionamento</a:t>
+            </a:r>
+          </a:p>
+          <a:p>
+            <a:pPr algn="ctr"/>
+            <a:r>
+              <a:rPr lang="it-IT" dirty="0" smtClean="0"/>
+              <a:t>il Release è una </a:t>
+            </a:r>
+            <a:r>
+              <a:rPr lang="it-IT" b="1" cap="all" dirty="0">
+                <a:solidFill>
+                  <a:schemeClr val="tx2"/>
+                </a:solidFill>
+                <a:cs typeface="Arial"/>
+              </a:rPr>
+              <a:t>pura e semplice scelta di business</a:t>
+            </a:r>
+          </a:p>
+          <a:p>
+            <a:endParaRPr lang="it-IT" dirty="0"/>
+          </a:p>
+        </p:txBody>
+      </p:sp>
+      <p:sp>
+        <p:nvSpPr>
+          <p:cNvPr id="4" name="Subtitle 3"/>
           <p:cNvSpPr>
             <a:spLocks noGrp="1"/>
           </p:cNvSpPr>
@@ -10561,110 +10390,7 @@
           <a:p>
             <a:r>
               <a:rPr lang="it-IT" dirty="0" smtClean="0"/>
-              <a:t>github</a:t>
-            </a:r>
-            <a:endParaRPr lang="it-IT" dirty="0"/>
-          </a:p>
-        </p:txBody>
-      </p:sp>
-      <p:sp>
-        <p:nvSpPr>
-          <p:cNvPr id="4" name="Content Placeholder 3"/>
-          <p:cNvSpPr>
-            <a:spLocks noGrp="1"/>
-          </p:cNvSpPr>
-          <p:nvPr>
-            <p:ph idx="10"/>
-          </p:nvPr>
-        </p:nvSpPr>
-        <p:spPr>
-          <a:xfrm>
-            <a:off x="603248" y="1594892"/>
-            <a:ext cx="7937501" cy="3181039"/>
-          </a:xfrm>
-        </p:spPr>
-        <p:txBody>
-          <a:bodyPr/>
-          <a:lstStyle/>
-          <a:p>
-            <a:pPr marL="0" indent="0">
-              <a:buNone/>
-            </a:pPr>
-            <a:r>
-              <a:rPr lang="it-IT" dirty="0" smtClean="0"/>
-              <a:t>Piattaforma web di supporto a GIT, permette di:</a:t>
-            </a:r>
-          </a:p>
-          <a:p>
-            <a:pPr>
-              <a:buFont typeface="Wingdings" panose="05000000000000000000" pitchFamily="2" charset="2"/>
-              <a:buChar char="§"/>
-            </a:pPr>
-            <a:r>
-              <a:rPr lang="it-IT" dirty="0" smtClean="0"/>
-              <a:t>Lavorare ai progetti in maniera condivisa all’interno del team, gestendo visivamente i commit</a:t>
-            </a:r>
-          </a:p>
-          <a:p>
-            <a:pPr>
-              <a:buFont typeface="Wingdings" panose="05000000000000000000" pitchFamily="2" charset="2"/>
-              <a:buChar char="§"/>
-            </a:pPr>
-            <a:r>
-              <a:rPr lang="it-IT" dirty="0" smtClean="0"/>
-              <a:t>Gestire le merge tra Branch tramite un sistema di </a:t>
-            </a:r>
-            <a:r>
-              <a:rPr lang="it-IT" cap="all" dirty="0">
-                <a:solidFill>
-                  <a:schemeClr val="tx2"/>
-                </a:solidFill>
-                <a:latin typeface="Arial"/>
-                <a:cs typeface="Arial"/>
-              </a:rPr>
-              <a:t>Pull Request </a:t>
-            </a:r>
-            <a:r>
-              <a:rPr lang="it-IT" dirty="0" smtClean="0"/>
-              <a:t>per controllare al meglio chi e cosa viene integrato</a:t>
-            </a:r>
-          </a:p>
-          <a:p>
-            <a:pPr>
-              <a:buFont typeface="Wingdings" panose="05000000000000000000" pitchFamily="2" charset="2"/>
-              <a:buChar char="§"/>
-            </a:pPr>
-            <a:r>
-              <a:rPr lang="it-IT" dirty="0" smtClean="0"/>
-              <a:t>Strumenti di supporto come Issue tracking, Wiki, ...</a:t>
-            </a:r>
-          </a:p>
-          <a:p>
-            <a:pPr>
-              <a:buFont typeface="Wingdings" panose="05000000000000000000" pitchFamily="2" charset="2"/>
-              <a:buChar char="§"/>
-            </a:pPr>
-            <a:r>
-              <a:rPr lang="it-IT" dirty="0" smtClean="0"/>
-              <a:t>Nessun supporto al CI integrato </a:t>
-            </a:r>
-          </a:p>
-          <a:p>
-            <a:pPr lvl="1">
-              <a:buFont typeface="Wingdings" panose="05000000000000000000" pitchFamily="2" charset="2"/>
-              <a:buChar char="§"/>
-            </a:pPr>
-            <a:r>
-              <a:rPr lang="it-IT" cap="all" dirty="0">
-                <a:solidFill>
-                  <a:schemeClr val="tx2"/>
-                </a:solidFill>
-              </a:rPr>
-              <a:t>Massima libertà di personalizzazione </a:t>
-            </a:r>
-            <a:r>
-              <a:rPr lang="it-IT" dirty="0" smtClean="0"/>
-              <a:t>!</a:t>
+              <a:t>Simili ma differenti</a:t>
             </a:r>
             <a:endParaRPr lang="it-IT" dirty="0"/>
           </a:p>
@@ -10673,13 +10399,21 @@
     </p:spTree>
     <p:extLst>
       <p:ext uri="{BB962C8B-B14F-4D97-AF65-F5344CB8AC3E}">
-        <p14:creationId xmlns:p14="http://schemas.microsoft.com/office/powerpoint/2010/main" val="926034539"/>
+        <p14:creationId xmlns:p14="http://schemas.microsoft.com/office/powerpoint/2010/main" val="1178647759"/>
       </p:ext>
     </p:extLst>
   </p:cSld>
   <p:clrMapOvr>
     <a:masterClrMapping/>
   </p:clrMapOvr>
+  <mc:AlternateContent xmlns:mc="http://schemas.openxmlformats.org/markup-compatibility/2006" xmlns:p14="http://schemas.microsoft.com/office/powerpoint/2010/main">
+    <mc:Choice Requires="p14">
+      <p:transition spd="slow" p14:dur="2000"/>
+    </mc:Choice>
+    <mc:Fallback xmlns="">
+      <p:transition spd="slow"/>
+    </mc:Fallback>
+  </mc:AlternateContent>
   <p:timing>
     <p:tnLst>
       <p:par>
@@ -10709,55 +10443,6 @@
       </p:grpSpPr>
       <p:sp>
         <p:nvSpPr>
-          <p:cNvPr id="8" name="Content Placeholder 7"/>
-          <p:cNvSpPr>
-            <a:spLocks noGrp="1"/>
-          </p:cNvSpPr>
-          <p:nvPr>
-            <p:ph sz="half" idx="1"/>
-          </p:nvPr>
-        </p:nvSpPr>
-        <p:spPr/>
-        <p:txBody>
-          <a:bodyPr/>
-          <a:lstStyle/>
-          <a:p>
-            <a:endParaRPr lang="it-IT" dirty="0" smtClean="0"/>
-          </a:p>
-          <a:p>
-            <a:r>
-              <a:rPr lang="it-IT" dirty="0" smtClean="0"/>
-              <a:t>Processo di Integrazione </a:t>
-            </a:r>
-            <a:r>
-              <a:rPr lang="it-IT" sz="1800" b="1" cap="all" dirty="0">
-                <a:solidFill>
-                  <a:schemeClr val="tx2"/>
-                </a:solidFill>
-                <a:latin typeface="Arial"/>
-                <a:cs typeface="Arial"/>
-              </a:rPr>
-              <a:t>Automatizzato</a:t>
-            </a:r>
-            <a:r>
-              <a:rPr lang="it-IT" dirty="0" smtClean="0"/>
-              <a:t>.</a:t>
-            </a:r>
-          </a:p>
-          <a:p>
-            <a:endParaRPr lang="it-IT" dirty="0" smtClean="0"/>
-          </a:p>
-          <a:p>
-            <a:r>
-              <a:rPr lang="it-IT" dirty="0" smtClean="0"/>
-              <a:t>Il commit sul VCS innesca una sequenza di step per verificare che il Branch siano integrabili in sicurezza.</a:t>
-            </a:r>
-            <a:endParaRPr lang="it-IT" dirty="0"/>
-          </a:p>
-        </p:txBody>
-      </p:sp>
-      <p:sp>
-        <p:nvSpPr>
           <p:cNvPr id="2" name="Title 1"/>
           <p:cNvSpPr>
             <a:spLocks noGrp="1"/>
@@ -10772,46 +10457,21 @@
           <a:lstStyle/>
           <a:p>
             <a:r>
-              <a:rPr lang="it-IT" smtClean="0"/>
-              <a:t>Ci pipelne</a:t>
+              <a:rPr lang="it-IT" dirty="0" smtClean="0"/>
+              <a:t>Continuous delivery</a:t>
             </a:r>
             <a:endParaRPr lang="it-IT" dirty="0"/>
           </a:p>
         </p:txBody>
       </p:sp>
-      <p:pic>
-        <p:nvPicPr>
-          <p:cNvPr id="10" name="Picture Placeholder 9"/>
-          <p:cNvPicPr>
-            <a:picLocks noGrp="1" noChangeAspect="1"/>
-          </p:cNvPicPr>
-          <p:nvPr>
-            <p:ph type="pic" sz="quarter" idx="11"/>
-          </p:nvPr>
-        </p:nvPicPr>
-        <p:blipFill>
-          <a:blip r:embed="rId2">
-            <a:extLst>
-              <a:ext uri="{28A0092B-C50C-407E-A947-70E740481C1C}">
-                <a14:useLocalDpi xmlns:a14="http://schemas.microsoft.com/office/drawing/2010/main" val="0"/>
-              </a:ext>
-            </a:extLst>
-          </a:blip>
-          <a:srcRect t="2764" b="2764"/>
-          <a:stretch>
-            <a:fillRect/>
-          </a:stretch>
-        </p:blipFill>
-        <p:spPr/>
-      </p:pic>
-      <p:sp>
-        <p:nvSpPr>
-          <p:cNvPr id="3" name="Subtitle 2"/>
+      <p:sp>
+        <p:nvSpPr>
+          <p:cNvPr id="6" name="Subtitle 5"/>
           <p:cNvSpPr>
             <a:spLocks noGrp="1"/>
           </p:cNvSpPr>
           <p:nvPr>
-            <p:ph type="subTitle" idx="12"/>
+            <p:ph type="subTitle" idx="1"/>
           </p:nvPr>
         </p:nvSpPr>
         <p:spPr/>
@@ -10821,16 +10481,94 @@
           <a:p>
             <a:r>
               <a:rPr lang="it-IT" dirty="0" smtClean="0"/>
-              <a:t>Integration flow</a:t>
+              <a:t>Due punti di scelta</a:t>
             </a:r>
             <a:endParaRPr lang="it-IT" dirty="0"/>
+          </a:p>
+        </p:txBody>
+      </p:sp>
+      <p:sp>
+        <p:nvSpPr>
+          <p:cNvPr id="4" name="Content Placeholder 3"/>
+          <p:cNvSpPr>
+            <a:spLocks noGrp="1"/>
+          </p:cNvSpPr>
+          <p:nvPr>
+            <p:ph idx="10"/>
+          </p:nvPr>
+        </p:nvSpPr>
+        <p:spPr>
+          <a:xfrm>
+            <a:off x="603248" y="1594892"/>
+            <a:ext cx="7937501" cy="2635030"/>
+          </a:xfrm>
+        </p:spPr>
+        <p:txBody>
+          <a:bodyPr/>
+          <a:lstStyle/>
+          <a:p>
+            <a:pPr marL="0" indent="0">
+              <a:buNone/>
+            </a:pPr>
+            <a:r>
+              <a:rPr lang="it-IT" b="1" cap="all" dirty="0">
+                <a:solidFill>
+                  <a:schemeClr val="tx2"/>
+                </a:solidFill>
+                <a:cs typeface="Arial"/>
+              </a:rPr>
+              <a:t>Deploy ?</a:t>
+            </a:r>
+          </a:p>
+          <a:p>
+            <a:pPr marL="0" indent="0">
+              <a:buNone/>
+            </a:pPr>
+            <a:r>
+              <a:rPr lang="it-IT" dirty="0" smtClean="0"/>
+              <a:t>La pipeline di CI è estesa, integrando un punto di scelta manuale per il deploy (in produzione o in un’altro ambiente ... Acceptance Test ??)</a:t>
+            </a:r>
+          </a:p>
+          <a:p>
+            <a:pPr marL="0" indent="0">
+              <a:buNone/>
+            </a:pPr>
+            <a:endParaRPr lang="it-IT" dirty="0"/>
+          </a:p>
+          <a:p>
+            <a:pPr marL="0" indent="0">
+              <a:buNone/>
+            </a:pPr>
+            <a:r>
+              <a:rPr lang="it-IT" b="1" cap="all" dirty="0">
+                <a:solidFill>
+                  <a:schemeClr val="tx2"/>
+                </a:solidFill>
+                <a:cs typeface="Arial"/>
+              </a:rPr>
+              <a:t>Release ?</a:t>
+            </a:r>
+          </a:p>
+          <a:p>
+            <a:pPr marL="0" indent="0">
+              <a:buNone/>
+            </a:pPr>
+            <a:r>
+              <a:rPr lang="it-IT" dirty="0" smtClean="0"/>
+              <a:t>Ogni feature è attivabile singolarmente e in modo trasparente, possibilità di gestire chi, cosa, quando e perchè per ciascuna.</a:t>
+            </a:r>
+            <a:r>
+              <a:rPr lang="it-IT" dirty="0"/>
+              <a:t> </a:t>
+            </a:r>
+            <a:endParaRPr lang="it-IT" dirty="0" smtClean="0"/>
           </a:p>
         </p:txBody>
       </p:sp>
     </p:spTree>
     <p:extLst>
       <p:ext uri="{BB962C8B-B14F-4D97-AF65-F5344CB8AC3E}">
-        <p14:creationId xmlns:p14="http://schemas.microsoft.com/office/powerpoint/2010/main" val="545391871"/>
+        <p14:creationId xmlns:p14="http://schemas.microsoft.com/office/powerpoint/2010/main" val="3775201042"/>
       </p:ext>
     </p:extLst>
   </p:cSld>

</xml_diff>